<commit_message>
Added brief explanation to Part 1k
</commit_message>
<xml_diff>
--- a/part1k.pptx
+++ b/part1k.pptx
@@ -6,14 +6,17 @@
   </p:sldMasterIdLst>
   <p:sldIdLst>
     <p:sldId id="256" r:id="rId2"/>
-    <p:sldId id="257" r:id="rId3"/>
-    <p:sldId id="258" r:id="rId4"/>
-    <p:sldId id="259" r:id="rId5"/>
-    <p:sldId id="260" r:id="rId6"/>
-    <p:sldId id="261" r:id="rId7"/>
-    <p:sldId id="262" r:id="rId8"/>
-    <p:sldId id="263" r:id="rId9"/>
-    <p:sldId id="264" r:id="rId10"/>
+    <p:sldId id="265" r:id="rId3"/>
+    <p:sldId id="266" r:id="rId4"/>
+    <p:sldId id="257" r:id="rId5"/>
+    <p:sldId id="258" r:id="rId6"/>
+    <p:sldId id="259" r:id="rId7"/>
+    <p:sldId id="260" r:id="rId8"/>
+    <p:sldId id="261" r:id="rId9"/>
+    <p:sldId id="262" r:id="rId10"/>
+    <p:sldId id="263" r:id="rId11"/>
+    <p:sldId id="264" r:id="rId12"/>
+    <p:sldId id="267" r:id="rId13"/>
   </p:sldIdLst>
   <p:sldSz cx="9144000" cy="6858000" type="screen4x3"/>
   <p:notesSz cx="6858000" cy="9144000"/>
@@ -3169,1326 +3172,7 @@
 </p:sld>
 </file>
 
-<file path=ppt/slides/slide2.xml><?xml version="1.0" encoding="utf-8"?>
-<p:sld xmlns:a="http://schemas.openxmlformats.org/drawingml/2006/main" xmlns:r="http://schemas.openxmlformats.org/officeDocument/2006/relationships" xmlns:p="http://schemas.openxmlformats.org/presentationml/2006/main">
-  <p:cSld>
-    <p:spTree>
-      <p:nvGrpSpPr>
-        <p:cNvPr id="1" name=""/>
-        <p:cNvGrpSpPr/>
-        <p:nvPr/>
-      </p:nvGrpSpPr>
-      <p:grpSpPr>
-        <a:xfrm>
-          <a:off x="0" y="0"/>
-          <a:ext cx="0" cy="0"/>
-          <a:chOff x="0" y="0"/>
-          <a:chExt cx="0" cy="0"/>
-        </a:xfrm>
-      </p:grpSpPr>
-      <p:sp>
-        <p:nvSpPr>
-          <p:cNvPr id="2" name="Title 1"/>
-          <p:cNvSpPr>
-            <a:spLocks noGrp="1"/>
-          </p:cNvSpPr>
-          <p:nvPr>
-            <p:ph type="title"/>
-          </p:nvPr>
-        </p:nvSpPr>
-        <p:spPr/>
-        <p:txBody>
-          <a:bodyPr/>
-          <a:lstStyle/>
-          <a:p>
-            <a:r>
-              <a:rPr lang="en-US" dirty="0" smtClean="0"/>
-              <a:t>Question 1.</a:t>
-            </a:r>
-            <a:endParaRPr lang="en-US" dirty="0"/>
-          </a:p>
-        </p:txBody>
-      </p:sp>
-      <p:sp>
-        <p:nvSpPr>
-          <p:cNvPr id="3" name="Content Placeholder 2"/>
-          <p:cNvSpPr>
-            <a:spLocks noGrp="1"/>
-          </p:cNvSpPr>
-          <p:nvPr>
-            <p:ph idx="1"/>
-          </p:nvPr>
-        </p:nvSpPr>
-        <p:spPr/>
-        <p:txBody>
-          <a:bodyPr/>
-          <a:lstStyle/>
-          <a:p>
-            <a:r>
-              <a:rPr lang="en-US" dirty="0"/>
-              <a:t>Here are the R commands to read in the file. [[Switch to a fixed width font like Courier New for R commands and R output.]]</a:t>
-            </a:r>
-          </a:p>
-          <a:p>
-            <a:pPr lvl="1"/>
-            <a:r>
-              <a:rPr lang="en-US" sz="2400" dirty="0">
-                <a:latin typeface="Courier New" panose="02070309020205020404" pitchFamily="49" charset="0"/>
-                <a:cs typeface="Courier New" panose="02070309020205020404" pitchFamily="49" charset="0"/>
-              </a:rPr>
-              <a:t>&gt; </a:t>
-            </a:r>
-            <a:r>
-              <a:rPr lang="en-US" sz="2400" dirty="0" err="1">
-                <a:latin typeface="Courier New" panose="02070309020205020404" pitchFamily="49" charset="0"/>
-                <a:cs typeface="Courier New" panose="02070309020205020404" pitchFamily="49" charset="0"/>
-              </a:rPr>
-              <a:t>fn</a:t>
-            </a:r>
-            <a:r>
-              <a:rPr lang="en-US" sz="2400" dirty="0">
-                <a:latin typeface="Courier New" panose="02070309020205020404" pitchFamily="49" charset="0"/>
-                <a:cs typeface="Courier New" panose="02070309020205020404" pitchFamily="49" charset="0"/>
-              </a:rPr>
-              <a:t> &lt;- "http://www.amstat.org/publications/jse/datasets/fat.dat.txt"</a:t>
-            </a:r>
-          </a:p>
-          <a:p>
-            <a:pPr lvl="1"/>
-            <a:r>
-              <a:rPr lang="en-US" sz="2400" dirty="0">
-                <a:latin typeface="Courier New" panose="02070309020205020404" pitchFamily="49" charset="0"/>
-                <a:cs typeface="Courier New" panose="02070309020205020404" pitchFamily="49" charset="0"/>
-              </a:rPr>
-              <a:t>&gt; </a:t>
-            </a:r>
-            <a:r>
-              <a:rPr lang="en-US" sz="2400" dirty="0" err="1">
-                <a:latin typeface="Courier New" panose="02070309020205020404" pitchFamily="49" charset="0"/>
-                <a:cs typeface="Courier New" panose="02070309020205020404" pitchFamily="49" charset="0"/>
-              </a:rPr>
-              <a:t>fd</a:t>
-            </a:r>
-            <a:r>
-              <a:rPr lang="en-US" sz="2400" dirty="0">
-                <a:latin typeface="Courier New" panose="02070309020205020404" pitchFamily="49" charset="0"/>
-                <a:cs typeface="Courier New" panose="02070309020205020404" pitchFamily="49" charset="0"/>
-              </a:rPr>
-              <a:t> &lt;- </a:t>
-            </a:r>
-            <a:r>
-              <a:rPr lang="en-US" sz="2400" dirty="0" err="1">
-                <a:latin typeface="Courier New" panose="02070309020205020404" pitchFamily="49" charset="0"/>
-                <a:cs typeface="Courier New" panose="02070309020205020404" pitchFamily="49" charset="0"/>
-              </a:rPr>
-              <a:t>read.table</a:t>
-            </a:r>
-            <a:r>
-              <a:rPr lang="en-US" sz="2400" dirty="0">
-                <a:latin typeface="Courier New" panose="02070309020205020404" pitchFamily="49" charset="0"/>
-                <a:cs typeface="Courier New" panose="02070309020205020404" pitchFamily="49" charset="0"/>
-              </a:rPr>
-              <a:t>(file=</a:t>
-            </a:r>
-            <a:r>
-              <a:rPr lang="en-US" sz="2400" dirty="0" err="1">
-                <a:latin typeface="Courier New" panose="02070309020205020404" pitchFamily="49" charset="0"/>
-                <a:cs typeface="Courier New" panose="02070309020205020404" pitchFamily="49" charset="0"/>
-              </a:rPr>
-              <a:t>fn</a:t>
-            </a:r>
-            <a:r>
-              <a:rPr lang="en-US" sz="2400" dirty="0">
-                <a:latin typeface="Courier New" panose="02070309020205020404" pitchFamily="49" charset="0"/>
-                <a:cs typeface="Courier New" panose="02070309020205020404" pitchFamily="49" charset="0"/>
-              </a:rPr>
-              <a:t>)</a:t>
-            </a:r>
-          </a:p>
-          <a:p>
-            <a:endParaRPr lang="en-US" dirty="0"/>
-          </a:p>
-        </p:txBody>
-      </p:sp>
-    </p:spTree>
-    <p:extLst>
-      <p:ext uri="{BB962C8B-B14F-4D97-AF65-F5344CB8AC3E}">
-        <p14:creationId xmlns:p14="http://schemas.microsoft.com/office/powerpoint/2010/main" val="2846466923"/>
-      </p:ext>
-    </p:extLst>
-  </p:cSld>
-  <p:clrMapOvr>
-    <a:masterClrMapping/>
-  </p:clrMapOvr>
-  <p:timing>
-    <p:tnLst>
-      <p:par>
-        <p:cTn id="1" dur="indefinite" restart="never" nodeType="tmRoot"/>
-      </p:par>
-    </p:tnLst>
-  </p:timing>
-</p:sld>
-</file>
-
-<file path=ppt/slides/slide3.xml><?xml version="1.0" encoding="utf-8"?>
-<p:sld xmlns:a="http://schemas.openxmlformats.org/drawingml/2006/main" xmlns:r="http://schemas.openxmlformats.org/officeDocument/2006/relationships" xmlns:p="http://schemas.openxmlformats.org/presentationml/2006/main">
-  <p:cSld>
-    <p:spTree>
-      <p:nvGrpSpPr>
-        <p:cNvPr id="1" name=""/>
-        <p:cNvGrpSpPr/>
-        <p:nvPr/>
-      </p:nvGrpSpPr>
-      <p:grpSpPr>
-        <a:xfrm>
-          <a:off x="0" y="0"/>
-          <a:ext cx="0" cy="0"/>
-          <a:chOff x="0" y="0"/>
-          <a:chExt cx="0" cy="0"/>
-        </a:xfrm>
-      </p:grpSpPr>
-      <p:sp>
-        <p:nvSpPr>
-          <p:cNvPr id="2" name="Title 1"/>
-          <p:cNvSpPr>
-            <a:spLocks noGrp="1"/>
-          </p:cNvSpPr>
-          <p:nvPr>
-            <p:ph type="title"/>
-          </p:nvPr>
-        </p:nvSpPr>
-        <p:spPr/>
-        <p:txBody>
-          <a:bodyPr/>
-          <a:lstStyle/>
-          <a:p>
-            <a:r>
-              <a:rPr lang="en-US" dirty="0" smtClean="0"/>
-              <a:t>Question 1.</a:t>
-            </a:r>
-            <a:endParaRPr lang="en-US" dirty="0"/>
-          </a:p>
-        </p:txBody>
-      </p:sp>
-      <p:sp>
-        <p:nvSpPr>
-          <p:cNvPr id="3" name="Content Placeholder 2"/>
-          <p:cNvSpPr>
-            <a:spLocks noGrp="1"/>
-          </p:cNvSpPr>
-          <p:nvPr>
-            <p:ph idx="1"/>
-          </p:nvPr>
-        </p:nvSpPr>
-        <p:spPr/>
-        <p:txBody>
-          <a:bodyPr>
-            <a:normAutofit fontScale="40000" lnSpcReduction="20000"/>
-          </a:bodyPr>
-          <a:lstStyle/>
-          <a:p>
-            <a:r>
-              <a:rPr lang="en-US" sz="8000" dirty="0"/>
-              <a:t>Here are the first few rows of the data set.</a:t>
-            </a:r>
-          </a:p>
-          <a:p>
-            <a:r>
-              <a:rPr lang="en-US" sz="3500" dirty="0">
-                <a:latin typeface="Courier New" panose="02070309020205020404" pitchFamily="49" charset="0"/>
-                <a:cs typeface="Courier New" panose="02070309020205020404" pitchFamily="49" charset="0"/>
-              </a:rPr>
-              <a:t>&gt; head(</a:t>
-            </a:r>
-            <a:r>
-              <a:rPr lang="en-US" sz="3500" dirty="0" err="1">
-                <a:latin typeface="Courier New" panose="02070309020205020404" pitchFamily="49" charset="0"/>
-                <a:cs typeface="Courier New" panose="02070309020205020404" pitchFamily="49" charset="0"/>
-              </a:rPr>
-              <a:t>fd</a:t>
-            </a:r>
-            <a:r>
-              <a:rPr lang="en-US" sz="3500" dirty="0">
-                <a:latin typeface="Courier New" panose="02070309020205020404" pitchFamily="49" charset="0"/>
-                <a:cs typeface="Courier New" panose="02070309020205020404" pitchFamily="49" charset="0"/>
-              </a:rPr>
-              <a:t>)</a:t>
-            </a:r>
-          </a:p>
-          <a:p>
-            <a:r>
-              <a:rPr lang="en-US" sz="3500" dirty="0">
-                <a:latin typeface="Courier New" panose="02070309020205020404" pitchFamily="49" charset="0"/>
-                <a:cs typeface="Courier New" panose="02070309020205020404" pitchFamily="49" charset="0"/>
-              </a:rPr>
-              <a:t>  V1   V2   V3     V4 V5     V6    V7   V8    V9  V10   V11   V12   V13</a:t>
-            </a:r>
-          </a:p>
-          <a:p>
-            <a:r>
-              <a:rPr lang="en-US" sz="3500" dirty="0">
-                <a:latin typeface="Courier New" panose="02070309020205020404" pitchFamily="49" charset="0"/>
-                <a:cs typeface="Courier New" panose="02070309020205020404" pitchFamily="49" charset="0"/>
-              </a:rPr>
-              <a:t>1  1 12.6 12.3 1.0708 23 154.25 67.75 23.7 134.9 36.2  93.1  85.2  94.5</a:t>
-            </a:r>
-          </a:p>
-          <a:p>
-            <a:r>
-              <a:rPr lang="en-US" sz="3500" dirty="0">
-                <a:latin typeface="Courier New" panose="02070309020205020404" pitchFamily="49" charset="0"/>
-                <a:cs typeface="Courier New" panose="02070309020205020404" pitchFamily="49" charset="0"/>
-              </a:rPr>
-              <a:t>2  2  6.9  6.1 1.0853 22 173.25 72.25 23.4 161.3 38.5  93.6  83.0  98.7</a:t>
-            </a:r>
-          </a:p>
-          <a:p>
-            <a:r>
-              <a:rPr lang="en-US" sz="3500" dirty="0">
-                <a:latin typeface="Courier New" panose="02070309020205020404" pitchFamily="49" charset="0"/>
-                <a:cs typeface="Courier New" panose="02070309020205020404" pitchFamily="49" charset="0"/>
-              </a:rPr>
-              <a:t>3  3 24.6 25.3 1.0414 22 154.00 66.25 24.7 116.0 34.0  95.8  87.9  99.2</a:t>
-            </a:r>
-          </a:p>
-          <a:p>
-            <a:r>
-              <a:rPr lang="en-US" sz="3500" dirty="0">
-                <a:latin typeface="Courier New" panose="02070309020205020404" pitchFamily="49" charset="0"/>
-                <a:cs typeface="Courier New" panose="02070309020205020404" pitchFamily="49" charset="0"/>
-              </a:rPr>
-              <a:t>4  4 10.9 10.4 1.0751 26 184.75 72.25 24.9 164.7 37.4 101.8  86.4 101.2</a:t>
-            </a:r>
-          </a:p>
-          <a:p>
-            <a:r>
-              <a:rPr lang="en-US" sz="3500" dirty="0">
-                <a:latin typeface="Courier New" panose="02070309020205020404" pitchFamily="49" charset="0"/>
-                <a:cs typeface="Courier New" panose="02070309020205020404" pitchFamily="49" charset="0"/>
-              </a:rPr>
-              <a:t>5  5 27.8 28.7 1.0340 24 184.25 71.25 25.6 133.1 34.4  97.3 100.0 101.9</a:t>
-            </a:r>
-          </a:p>
-          <a:p>
-            <a:r>
-              <a:rPr lang="en-US" sz="3500" dirty="0">
-                <a:latin typeface="Courier New" panose="02070309020205020404" pitchFamily="49" charset="0"/>
-                <a:cs typeface="Courier New" panose="02070309020205020404" pitchFamily="49" charset="0"/>
-              </a:rPr>
-              <a:t>6  6 20.6 20.9 1.0502 24 210.25 74.75 26.5 167.0 39.0 104.5  94.4 107.8</a:t>
-            </a:r>
-          </a:p>
-          <a:p>
-            <a:r>
-              <a:rPr lang="en-US" sz="3500" dirty="0">
-                <a:latin typeface="Courier New" panose="02070309020205020404" pitchFamily="49" charset="0"/>
-                <a:cs typeface="Courier New" panose="02070309020205020404" pitchFamily="49" charset="0"/>
-              </a:rPr>
-              <a:t>   V14  V15  V16  V17  V18  V19</a:t>
-            </a:r>
-          </a:p>
-          <a:p>
-            <a:r>
-              <a:rPr lang="en-US" sz="3500" dirty="0">
-                <a:latin typeface="Courier New" panose="02070309020205020404" pitchFamily="49" charset="0"/>
-                <a:cs typeface="Courier New" panose="02070309020205020404" pitchFamily="49" charset="0"/>
-              </a:rPr>
-              <a:t>1 59.0 37.3 21.9 32.0 27.4 17.1</a:t>
-            </a:r>
-          </a:p>
-          <a:p>
-            <a:r>
-              <a:rPr lang="en-US" sz="3500" dirty="0">
-                <a:latin typeface="Courier New" panose="02070309020205020404" pitchFamily="49" charset="0"/>
-                <a:cs typeface="Courier New" panose="02070309020205020404" pitchFamily="49" charset="0"/>
-              </a:rPr>
-              <a:t>2 58.7 37.3 23.4 30.5 28.9 18.2</a:t>
-            </a:r>
-          </a:p>
-          <a:p>
-            <a:r>
-              <a:rPr lang="en-US" sz="3500" dirty="0">
-                <a:latin typeface="Courier New" panose="02070309020205020404" pitchFamily="49" charset="0"/>
-                <a:cs typeface="Courier New" panose="02070309020205020404" pitchFamily="49" charset="0"/>
-              </a:rPr>
-              <a:t>3 59.6 38.9 24.0 28.8 25.2 16.6</a:t>
-            </a:r>
-          </a:p>
-          <a:p>
-            <a:r>
-              <a:rPr lang="en-US" sz="3500" dirty="0">
-                <a:latin typeface="Courier New" panose="02070309020205020404" pitchFamily="49" charset="0"/>
-                <a:cs typeface="Courier New" panose="02070309020205020404" pitchFamily="49" charset="0"/>
-              </a:rPr>
-              <a:t>4 60.1 37.3 22.8 32.4 29.4 18.2</a:t>
-            </a:r>
-          </a:p>
-          <a:p>
-            <a:r>
-              <a:rPr lang="en-US" sz="3500" dirty="0">
-                <a:latin typeface="Courier New" panose="02070309020205020404" pitchFamily="49" charset="0"/>
-                <a:cs typeface="Courier New" panose="02070309020205020404" pitchFamily="49" charset="0"/>
-              </a:rPr>
-              <a:t>5 63.2 42.2 24.0 32.2 27.7 17.7</a:t>
-            </a:r>
-          </a:p>
-          <a:p>
-            <a:r>
-              <a:rPr lang="en-US" sz="3500" dirty="0">
-                <a:latin typeface="Courier New" panose="02070309020205020404" pitchFamily="49" charset="0"/>
-                <a:cs typeface="Courier New" panose="02070309020205020404" pitchFamily="49" charset="0"/>
-              </a:rPr>
-              <a:t>6 66.0 42.0 25.6 35.7 30.6 18.8</a:t>
-            </a:r>
-          </a:p>
-          <a:p>
-            <a:endParaRPr lang="en-US" dirty="0"/>
-          </a:p>
-        </p:txBody>
-      </p:sp>
-    </p:spTree>
-    <p:extLst>
-      <p:ext uri="{BB962C8B-B14F-4D97-AF65-F5344CB8AC3E}">
-        <p14:creationId xmlns:p14="http://schemas.microsoft.com/office/powerpoint/2010/main" val="2587487952"/>
-      </p:ext>
-    </p:extLst>
-  </p:cSld>
-  <p:clrMapOvr>
-    <a:masterClrMapping/>
-  </p:clrMapOvr>
-  <p:timing>
-    <p:tnLst>
-      <p:par>
-        <p:cTn id="1" dur="indefinite" restart="never" nodeType="tmRoot"/>
-      </p:par>
-    </p:tnLst>
-  </p:timing>
-</p:sld>
-</file>
-
-<file path=ppt/slides/slide4.xml><?xml version="1.0" encoding="utf-8"?>
-<p:sld xmlns:a="http://schemas.openxmlformats.org/drawingml/2006/main" xmlns:r="http://schemas.openxmlformats.org/officeDocument/2006/relationships" xmlns:p="http://schemas.openxmlformats.org/presentationml/2006/main">
-  <p:cSld>
-    <p:spTree>
-      <p:nvGrpSpPr>
-        <p:cNvPr id="1" name=""/>
-        <p:cNvGrpSpPr/>
-        <p:nvPr/>
-      </p:nvGrpSpPr>
-      <p:grpSpPr>
-        <a:xfrm>
-          <a:off x="0" y="0"/>
-          <a:ext cx="0" cy="0"/>
-          <a:chOff x="0" y="0"/>
-          <a:chExt cx="0" cy="0"/>
-        </a:xfrm>
-      </p:grpSpPr>
-      <p:sp>
-        <p:nvSpPr>
-          <p:cNvPr id="2" name="Title 1"/>
-          <p:cNvSpPr>
-            <a:spLocks noGrp="1"/>
-          </p:cNvSpPr>
-          <p:nvPr>
-            <p:ph type="title"/>
-          </p:nvPr>
-        </p:nvSpPr>
-        <p:spPr/>
-        <p:txBody>
-          <a:bodyPr/>
-          <a:lstStyle/>
-          <a:p>
-            <a:r>
-              <a:rPr lang="en-US" dirty="0" smtClean="0"/>
-              <a:t>Question 1.</a:t>
-            </a:r>
-            <a:endParaRPr lang="en-US" dirty="0"/>
-          </a:p>
-        </p:txBody>
-      </p:sp>
-      <p:sp>
-        <p:nvSpPr>
-          <p:cNvPr id="3" name="Content Placeholder 2"/>
-          <p:cNvSpPr>
-            <a:spLocks noGrp="1"/>
-          </p:cNvSpPr>
-          <p:nvPr>
-            <p:ph idx="1"/>
-          </p:nvPr>
-        </p:nvSpPr>
-        <p:spPr/>
-        <p:txBody>
-          <a:bodyPr>
-            <a:normAutofit fontScale="40000" lnSpcReduction="20000"/>
-          </a:bodyPr>
-          <a:lstStyle/>
-          <a:p>
-            <a:r>
-              <a:rPr lang="en-US" sz="8000" dirty="0"/>
-              <a:t>Here are the last few rows of the data set.</a:t>
-            </a:r>
-          </a:p>
-          <a:p>
-            <a:r>
-              <a:rPr lang="en-US" dirty="0">
-                <a:latin typeface="Courier New" panose="02070309020205020404" pitchFamily="49" charset="0"/>
-                <a:cs typeface="Courier New" panose="02070309020205020404" pitchFamily="49" charset="0"/>
-              </a:rPr>
-              <a:t>&gt; tail(</a:t>
-            </a:r>
-            <a:r>
-              <a:rPr lang="en-US" dirty="0" err="1">
-                <a:latin typeface="Courier New" panose="02070309020205020404" pitchFamily="49" charset="0"/>
-                <a:cs typeface="Courier New" panose="02070309020205020404" pitchFamily="49" charset="0"/>
-              </a:rPr>
-              <a:t>fd</a:t>
-            </a:r>
-            <a:r>
-              <a:rPr lang="en-US" dirty="0">
-                <a:latin typeface="Courier New" panose="02070309020205020404" pitchFamily="49" charset="0"/>
-                <a:cs typeface="Courier New" panose="02070309020205020404" pitchFamily="49" charset="0"/>
-              </a:rPr>
-              <a:t>)</a:t>
-            </a:r>
-          </a:p>
-          <a:p>
-            <a:r>
-              <a:rPr lang="en-US" dirty="0" smtClean="0">
-                <a:latin typeface="Courier New" panose="02070309020205020404" pitchFamily="49" charset="0"/>
-                <a:cs typeface="Courier New" panose="02070309020205020404" pitchFamily="49" charset="0"/>
-              </a:rPr>
-              <a:t>     </a:t>
-            </a:r>
-            <a:r>
-              <a:rPr lang="en-US" dirty="0">
-                <a:latin typeface="Courier New" panose="02070309020205020404" pitchFamily="49" charset="0"/>
-                <a:cs typeface="Courier New" panose="02070309020205020404" pitchFamily="49" charset="0"/>
-              </a:rPr>
-              <a:t>V1   V2   V3     V4 V5     V6    V7   V8    V9  V10   V11   V12   V13</a:t>
-            </a:r>
-          </a:p>
-          <a:p>
-            <a:r>
-              <a:rPr lang="en-US" dirty="0">
-                <a:latin typeface="Courier New" panose="02070309020205020404" pitchFamily="49" charset="0"/>
-                <a:cs typeface="Courier New" panose="02070309020205020404" pitchFamily="49" charset="0"/>
-              </a:rPr>
-              <a:t>247 247 29.1 30.2 1.0308 69 215.50 70.50 30.5 152.7 40.8 113.7 107.6 110.0</a:t>
-            </a:r>
-          </a:p>
-          <a:p>
-            <a:r>
-              <a:rPr lang="en-US" dirty="0">
-                <a:latin typeface="Courier New" panose="02070309020205020404" pitchFamily="49" charset="0"/>
-                <a:cs typeface="Courier New" panose="02070309020205020404" pitchFamily="49" charset="0"/>
-              </a:rPr>
-              <a:t>248 248 11.5 11.0 1.0736 70 134.25 67.00 21.1 118.9 34.9  89.2  83.6  88.8</a:t>
-            </a:r>
-          </a:p>
-          <a:p>
-            <a:r>
-              <a:rPr lang="en-US" dirty="0">
-                <a:latin typeface="Courier New" panose="02070309020205020404" pitchFamily="49" charset="0"/>
-                <a:cs typeface="Courier New" panose="02070309020205020404" pitchFamily="49" charset="0"/>
-              </a:rPr>
-              <a:t>249 249 32.3 33.6 1.0236 72 201.00 69.75 29.1 136.1 40.9 108.5 105.0 104.5</a:t>
-            </a:r>
-          </a:p>
-          <a:p>
-            <a:r>
-              <a:rPr lang="en-US" dirty="0">
-                <a:latin typeface="Courier New" panose="02070309020205020404" pitchFamily="49" charset="0"/>
-                <a:cs typeface="Courier New" panose="02070309020205020404" pitchFamily="49" charset="0"/>
-              </a:rPr>
-              <a:t>250 250 28.3 29.3 1.0328 72 186.75 66.00 30.2 133.9 38.9 111.1 111.5 101.7</a:t>
-            </a:r>
-          </a:p>
-          <a:p>
-            <a:r>
-              <a:rPr lang="en-US" dirty="0">
-                <a:latin typeface="Courier New" panose="02070309020205020404" pitchFamily="49" charset="0"/>
-                <a:cs typeface="Courier New" panose="02070309020205020404" pitchFamily="49" charset="0"/>
-              </a:rPr>
-              <a:t>251 251 25.3 26.0 1.0399 72 190.75 70.50 27.0 142.6 38.9 108.3 101.3  97.8</a:t>
-            </a:r>
-          </a:p>
-          <a:p>
-            <a:r>
-              <a:rPr lang="en-US" dirty="0">
-                <a:latin typeface="Courier New" panose="02070309020205020404" pitchFamily="49" charset="0"/>
-                <a:cs typeface="Courier New" panose="02070309020205020404" pitchFamily="49" charset="0"/>
-              </a:rPr>
-              <a:t>252 252 30.7 31.9 1.0271 74 207.50 70.00 29.8 143.7 40.8 112.4 108.5 107.1</a:t>
-            </a:r>
-          </a:p>
-          <a:p>
-            <a:r>
-              <a:rPr lang="en-US" dirty="0">
-                <a:latin typeface="Courier New" panose="02070309020205020404" pitchFamily="49" charset="0"/>
-                <a:cs typeface="Courier New" panose="02070309020205020404" pitchFamily="49" charset="0"/>
-              </a:rPr>
-              <a:t>     V14  V15  V16  V17  V18  V19</a:t>
-            </a:r>
-          </a:p>
-          <a:p>
-            <a:r>
-              <a:rPr lang="en-US" dirty="0">
-                <a:latin typeface="Courier New" panose="02070309020205020404" pitchFamily="49" charset="0"/>
-                <a:cs typeface="Courier New" panose="02070309020205020404" pitchFamily="49" charset="0"/>
-              </a:rPr>
-              <a:t>247 63.3 44.0 22.6 37.5 32.6 18.8</a:t>
-            </a:r>
-          </a:p>
-          <a:p>
-            <a:r>
-              <a:rPr lang="en-US" dirty="0">
-                <a:latin typeface="Courier New" panose="02070309020205020404" pitchFamily="49" charset="0"/>
-                <a:cs typeface="Courier New" panose="02070309020205020404" pitchFamily="49" charset="0"/>
-              </a:rPr>
-              <a:t>248 49.6 34.8 21.5 25.6 25.7 18.5</a:t>
-            </a:r>
-          </a:p>
-          <a:p>
-            <a:r>
-              <a:rPr lang="en-US" dirty="0">
-                <a:latin typeface="Courier New" panose="02070309020205020404" pitchFamily="49" charset="0"/>
-                <a:cs typeface="Courier New" panose="02070309020205020404" pitchFamily="49" charset="0"/>
-              </a:rPr>
-              <a:t>249 59.6 40.8 23.2 35.2 28.6 20.1</a:t>
-            </a:r>
-          </a:p>
-          <a:p>
-            <a:r>
-              <a:rPr lang="en-US" dirty="0">
-                <a:latin typeface="Courier New" panose="02070309020205020404" pitchFamily="49" charset="0"/>
-                <a:cs typeface="Courier New" panose="02070309020205020404" pitchFamily="49" charset="0"/>
-              </a:rPr>
-              <a:t>250 60.3 37.3 21.5 31.3 27.2 18.0</a:t>
-            </a:r>
-          </a:p>
-          <a:p>
-            <a:r>
-              <a:rPr lang="en-US" dirty="0">
-                <a:latin typeface="Courier New" panose="02070309020205020404" pitchFamily="49" charset="0"/>
-                <a:cs typeface="Courier New" panose="02070309020205020404" pitchFamily="49" charset="0"/>
-              </a:rPr>
-              <a:t>251 56.0 41.6 22.7 30.5 29.4 19.8</a:t>
-            </a:r>
-          </a:p>
-          <a:p>
-            <a:r>
-              <a:rPr lang="en-US" dirty="0">
-                <a:latin typeface="Courier New" panose="02070309020205020404" pitchFamily="49" charset="0"/>
-                <a:cs typeface="Courier New" panose="02070309020205020404" pitchFamily="49" charset="0"/>
-              </a:rPr>
-              <a:t>252 59.3 42.2 24.6 33.7 30.0 20.9</a:t>
-            </a:r>
-          </a:p>
-          <a:p>
-            <a:endParaRPr lang="en-US" dirty="0"/>
-          </a:p>
-        </p:txBody>
-      </p:sp>
-    </p:spTree>
-    <p:extLst>
-      <p:ext uri="{BB962C8B-B14F-4D97-AF65-F5344CB8AC3E}">
-        <p14:creationId xmlns:p14="http://schemas.microsoft.com/office/powerpoint/2010/main" val="2045493957"/>
-      </p:ext>
-    </p:extLst>
-  </p:cSld>
-  <p:clrMapOvr>
-    <a:masterClrMapping/>
-  </p:clrMapOvr>
-  <p:timing>
-    <p:tnLst>
-      <p:par>
-        <p:cTn id="1" dur="indefinite" restart="never" nodeType="tmRoot"/>
-      </p:par>
-    </p:tnLst>
-  </p:timing>
-</p:sld>
-</file>
-
-<file path=ppt/slides/slide5.xml><?xml version="1.0" encoding="utf-8"?>
-<p:sld xmlns:a="http://schemas.openxmlformats.org/drawingml/2006/main" xmlns:r="http://schemas.openxmlformats.org/officeDocument/2006/relationships" xmlns:p="http://schemas.openxmlformats.org/presentationml/2006/main">
-  <p:cSld>
-    <p:spTree>
-      <p:nvGrpSpPr>
-        <p:cNvPr id="1" name=""/>
-        <p:cNvGrpSpPr/>
-        <p:nvPr/>
-      </p:nvGrpSpPr>
-      <p:grpSpPr>
-        <a:xfrm>
-          <a:off x="0" y="0"/>
-          <a:ext cx="0" cy="0"/>
-          <a:chOff x="0" y="0"/>
-          <a:chExt cx="0" cy="0"/>
-        </a:xfrm>
-      </p:grpSpPr>
-      <p:sp>
-        <p:nvSpPr>
-          <p:cNvPr id="2" name="Title 1"/>
-          <p:cNvSpPr>
-            <a:spLocks noGrp="1"/>
-          </p:cNvSpPr>
-          <p:nvPr>
-            <p:ph type="title"/>
-          </p:nvPr>
-        </p:nvSpPr>
-        <p:spPr/>
-        <p:txBody>
-          <a:bodyPr/>
-          <a:lstStyle/>
-          <a:p>
-            <a:r>
-              <a:rPr lang="en-US" dirty="0" smtClean="0"/>
-              <a:t>Question 2.</a:t>
-            </a:r>
-            <a:endParaRPr lang="en-US" dirty="0"/>
-          </a:p>
-        </p:txBody>
-      </p:sp>
-      <p:sp>
-        <p:nvSpPr>
-          <p:cNvPr id="3" name="Content Placeholder 2"/>
-          <p:cNvSpPr>
-            <a:spLocks noGrp="1"/>
-          </p:cNvSpPr>
-          <p:nvPr>
-            <p:ph idx="1"/>
-          </p:nvPr>
-        </p:nvSpPr>
-        <p:spPr/>
-        <p:txBody>
-          <a:bodyPr>
-            <a:normAutofit fontScale="25000" lnSpcReduction="20000"/>
-          </a:bodyPr>
-          <a:lstStyle/>
-          <a:p>
-            <a:r>
-              <a:rPr lang="en-US" sz="12800" dirty="0"/>
-              <a:t>Here are all the </a:t>
-            </a:r>
-            <a:r>
-              <a:rPr lang="en-US" sz="12800" dirty="0" err="1"/>
-              <a:t>bmi</a:t>
-            </a:r>
-            <a:r>
-              <a:rPr lang="en-US" sz="12800" dirty="0"/>
-              <a:t> values.</a:t>
-            </a:r>
-          </a:p>
-          <a:p>
-            <a:r>
-              <a:rPr lang="en-US" sz="4800" dirty="0">
-                <a:latin typeface="Courier New" panose="02070309020205020404" pitchFamily="49" charset="0"/>
-                <a:cs typeface="Courier New" panose="02070309020205020404" pitchFamily="49" charset="0"/>
-              </a:rPr>
-              <a:t>&gt; names(</a:t>
-            </a:r>
-            <a:r>
-              <a:rPr lang="en-US" sz="4800" dirty="0" err="1">
-                <a:latin typeface="Courier New" panose="02070309020205020404" pitchFamily="49" charset="0"/>
-                <a:cs typeface="Courier New" panose="02070309020205020404" pitchFamily="49" charset="0"/>
-              </a:rPr>
-              <a:t>fd</a:t>
-            </a:r>
-            <a:r>
-              <a:rPr lang="en-US" sz="4800" dirty="0">
-                <a:latin typeface="Courier New" panose="02070309020205020404" pitchFamily="49" charset="0"/>
-                <a:cs typeface="Courier New" panose="02070309020205020404" pitchFamily="49" charset="0"/>
-              </a:rPr>
-              <a:t>) &lt;- c("case","fat.b","fat.s","dens","age","wt","ht","bmi","ffw","neck","chest","abdomen","hip","thigh","knee","ankle","biceps","forearm","wrist")</a:t>
-            </a:r>
-          </a:p>
-          <a:p>
-            <a:r>
-              <a:rPr lang="en-US" sz="4800" dirty="0">
-                <a:latin typeface="Courier New" panose="02070309020205020404" pitchFamily="49" charset="0"/>
-                <a:cs typeface="Courier New" panose="02070309020205020404" pitchFamily="49" charset="0"/>
-              </a:rPr>
-              <a:t>&gt; </a:t>
-            </a:r>
-            <a:r>
-              <a:rPr lang="en-US" sz="4800" dirty="0" err="1">
-                <a:latin typeface="Courier New" panose="02070309020205020404" pitchFamily="49" charset="0"/>
-                <a:cs typeface="Courier New" panose="02070309020205020404" pitchFamily="49" charset="0"/>
-              </a:rPr>
-              <a:t>fd$bmi</a:t>
-            </a:r>
-            <a:endParaRPr lang="en-US" sz="4800" dirty="0">
-              <a:latin typeface="Courier New" panose="02070309020205020404" pitchFamily="49" charset="0"/>
-              <a:cs typeface="Courier New" panose="02070309020205020404" pitchFamily="49" charset="0"/>
-            </a:endParaRPr>
-          </a:p>
-          <a:p>
-            <a:r>
-              <a:rPr lang="en-US" sz="4800" dirty="0">
-                <a:latin typeface="Courier New" panose="02070309020205020404" pitchFamily="49" charset="0"/>
-                <a:cs typeface="Courier New" panose="02070309020205020404" pitchFamily="49" charset="0"/>
-              </a:rPr>
-              <a:t>  [1] 23.7 23.4 24.7 24.9 25.6 26.5 26.2 23.6 24.6 25.8 23.6 26.3 26.3 28.5</a:t>
-            </a:r>
-          </a:p>
-          <a:p>
-            <a:r>
-              <a:rPr lang="en-US" sz="4800" dirty="0">
-                <a:latin typeface="Courier New" panose="02070309020205020404" pitchFamily="49" charset="0"/>
-                <a:cs typeface="Courier New" panose="02070309020205020404" pitchFamily="49" charset="0"/>
-              </a:rPr>
-              <a:t> [15] 27.4 26.3 27.3 29.2 28.2 27.6 27.3 29.1 21.2 21.4 23.2 21.9 20.3 22.9</a:t>
-            </a:r>
-          </a:p>
-          <a:p>
-            <a:r>
-              <a:rPr lang="en-US" sz="4800" dirty="0">
-                <a:latin typeface="Courier New" panose="02070309020205020404" pitchFamily="49" charset="0"/>
-                <a:cs typeface="Courier New" panose="02070309020205020404" pitchFamily="49" charset="0"/>
-              </a:rPr>
-              <a:t> [29] 22.4 23.8 23.6 22.2 23.3 30.5 32.2 32.0 29.1 29.7 48.9 31.8 39.1 29.9</a:t>
-            </a:r>
-          </a:p>
-          <a:p>
-            <a:r>
-              <a:rPr lang="en-US" sz="4800" dirty="0">
-                <a:latin typeface="Courier New" panose="02070309020205020404" pitchFamily="49" charset="0"/>
-                <a:cs typeface="Courier New" panose="02070309020205020404" pitchFamily="49" charset="0"/>
-              </a:rPr>
-              <a:t> [43] 31.2 29.2 19.1 21.3 20.6 20.6 20.4 20.2 21.3 20.6 21.1 19.9 21.1 26.9</a:t>
-            </a:r>
-          </a:p>
-          <a:p>
-            <a:r>
-              <a:rPr lang="en-US" sz="4800" dirty="0">
-                <a:latin typeface="Courier New" panose="02070309020205020404" pitchFamily="49" charset="0"/>
-                <a:cs typeface="Courier New" panose="02070309020205020404" pitchFamily="49" charset="0"/>
-              </a:rPr>
-              <a:t> [57] 27.6 29.3 28.4 29.2 28.2 26.8 27.6 27.9 29.5 28.3 21.3 21.3 22.8 21.6</a:t>
-            </a:r>
-          </a:p>
-          <a:p>
-            <a:r>
-              <a:rPr lang="en-US" sz="4800" dirty="0">
-                <a:latin typeface="Courier New" panose="02070309020205020404" pitchFamily="49" charset="0"/>
-                <a:cs typeface="Courier New" panose="02070309020205020404" pitchFamily="49" charset="0"/>
-              </a:rPr>
-              <a:t> [71] 23.1 21.9 20.8 21.5 23.3 22.9 23.7 26.7 23.0 25.1 25.1 23.4 25.3 24.5</a:t>
-            </a:r>
-          </a:p>
-          <a:p>
-            <a:r>
-              <a:rPr lang="en-US" sz="4800" dirty="0">
-                <a:latin typeface="Courier New" panose="02070309020205020404" pitchFamily="49" charset="0"/>
-                <a:cs typeface="Courier New" panose="02070309020205020404" pitchFamily="49" charset="0"/>
-              </a:rPr>
-              <a:t> [85] 24.7 26.0 24.6 26.0 23.7 23.3 25.4 26.2 23.4 26.3 23.4 26.1 24.8 25.9</a:t>
-            </a:r>
-          </a:p>
-          <a:p>
-            <a:r>
-              <a:rPr lang="en-US" sz="4800" dirty="0">
-                <a:latin typeface="Courier New" panose="02070309020205020404" pitchFamily="49" charset="0"/>
-                <a:cs typeface="Courier New" panose="02070309020205020404" pitchFamily="49" charset="0"/>
-              </a:rPr>
-              <a:t> [99] 23.7 26.7 25.9 23.6 24.0 25.5 26.0 24.8 26.0 26.0 24.0 24.7 25.6 26.3</a:t>
-            </a:r>
-          </a:p>
-          <a:p>
-            <a:r>
-              <a:rPr lang="en-US" sz="4800" dirty="0">
-                <a:latin typeface="Courier New" panose="02070309020205020404" pitchFamily="49" charset="0"/>
-                <a:cs typeface="Courier New" panose="02070309020205020404" pitchFamily="49" charset="0"/>
-              </a:rPr>
-              <a:t>[113] 25.6 23.3 24.0 23.4 23.6 24.3 24.6 25.3 26.2 25.5 23.9 23.9 25.6 26.2</a:t>
-            </a:r>
-          </a:p>
-          <a:p>
-            <a:r>
-              <a:rPr lang="en-US" sz="4800" dirty="0">
-                <a:latin typeface="Courier New" panose="02070309020205020404" pitchFamily="49" charset="0"/>
-                <a:cs typeface="Courier New" panose="02070309020205020404" pitchFamily="49" charset="0"/>
-              </a:rPr>
-              <a:t>[127] 26.4 23.4 25.2 23.9 23.7 24.3 25.8 24.8 24.5 26.8 23.5 24.1 23.3 26.6</a:t>
-            </a:r>
-          </a:p>
-          <a:p>
-            <a:r>
-              <a:rPr lang="en-US" sz="4800" dirty="0">
-                <a:latin typeface="Courier New" panose="02070309020205020404" pitchFamily="49" charset="0"/>
-                <a:cs typeface="Courier New" panose="02070309020205020404" pitchFamily="49" charset="0"/>
-              </a:rPr>
-              <a:t>[141] 24.6 25.3 25.6 21.6 22.1 21.9 27.7 29.8 19.3 31.8 22.5 30.7 19.7 24.4</a:t>
-            </a:r>
-          </a:p>
-          <a:p>
-            <a:r>
-              <a:rPr lang="en-US" sz="4800" dirty="0">
-                <a:latin typeface="Courier New" panose="02070309020205020404" pitchFamily="49" charset="0"/>
-                <a:cs typeface="Courier New" panose="02070309020205020404" pitchFamily="49" charset="0"/>
-              </a:rPr>
-              <a:t>[155] 26.1 21.6 30.4 24.6 20.3 24.4 20.4 25.9 24.4 19.8 29.7 28.1 25.3 30.3</a:t>
-            </a:r>
-          </a:p>
-          <a:p>
-            <a:r>
-              <a:rPr lang="en-US" sz="4800" dirty="0">
-                <a:latin typeface="Courier New" panose="02070309020205020404" pitchFamily="49" charset="0"/>
-                <a:cs typeface="Courier New" panose="02070309020205020404" pitchFamily="49" charset="0"/>
-              </a:rPr>
-              <a:t>[169] 33.3 25.2 23.4 20.6 24.8 24.3 31.0 21.3 23.7 33.2 27.5 29.8 28.0 18.1</a:t>
-            </a:r>
-          </a:p>
-          <a:p>
-            <a:r>
-              <a:rPr lang="en-US" sz="4800" dirty="0">
-                <a:latin typeface="Courier New" panose="02070309020205020404" pitchFamily="49" charset="0"/>
-                <a:cs typeface="Courier New" panose="02070309020205020404" pitchFamily="49" charset="0"/>
-              </a:rPr>
-              <a:t>[183] 22.7 23.0 21.8 23.1 29.7 28.6 27.0 28.0 22.5 29.8 27.4 28.3 21.6 27.2</a:t>
-            </a:r>
-          </a:p>
-          <a:p>
-            <a:r>
-              <a:rPr lang="en-US" sz="4800" dirty="0">
-                <a:latin typeface="Courier New" panose="02070309020205020404" pitchFamily="49" charset="0"/>
-                <a:cs typeface="Courier New" panose="02070309020205020404" pitchFamily="49" charset="0"/>
-              </a:rPr>
-              <a:t>[197] 23.1 23.1 22.3 26.4 25.4 22.0 27.6 23.7 32.3 27.6 27.2 26.1 22.9 22.5</a:t>
-            </a:r>
-          </a:p>
-          <a:p>
-            <a:r>
-              <a:rPr lang="en-US" sz="4800" dirty="0">
-                <a:latin typeface="Courier New" panose="02070309020205020404" pitchFamily="49" charset="0"/>
-                <a:cs typeface="Courier New" panose="02070309020205020404" pitchFamily="49" charset="0"/>
-              </a:rPr>
-              <a:t>[211] 21.4 27.4 23.0 27.4 22.8 37.6 21.6 22.2 27.2 22.7 24.5 31.0 25.0 22.2</a:t>
-            </a:r>
-          </a:p>
-          <a:p>
-            <a:r>
-              <a:rPr lang="en-US" sz="4800" dirty="0">
-                <a:latin typeface="Courier New" panose="02070309020205020404" pitchFamily="49" charset="0"/>
-                <a:cs typeface="Courier New" panose="02070309020205020404" pitchFamily="49" charset="0"/>
-              </a:rPr>
-              <a:t>[225] 26.8 20.0 25.6 25.3 25.4 25.2 24.1 24.9 24.2 25.2 24.1 26.1 25.8 31.9</a:t>
-            </a:r>
-          </a:p>
-          <a:p>
-            <a:r>
-              <a:rPr lang="en-US" sz="4800" dirty="0">
-                <a:latin typeface="Courier New" panose="02070309020205020404" pitchFamily="49" charset="0"/>
-                <a:cs typeface="Courier New" panose="02070309020205020404" pitchFamily="49" charset="0"/>
-              </a:rPr>
-              <a:t>[239] 22.6 30.9 20.8 33.9 31.8 30.3 29.9 22.8 30.5 21.1 29.1 30.2 27.0 29.8</a:t>
-            </a:r>
-          </a:p>
-          <a:p>
-            <a:endParaRPr lang="en-US" sz="4800" dirty="0">
-              <a:latin typeface="Courier New" panose="02070309020205020404" pitchFamily="49" charset="0"/>
-              <a:cs typeface="Courier New" panose="02070309020205020404" pitchFamily="49" charset="0"/>
-            </a:endParaRPr>
-          </a:p>
-        </p:txBody>
-      </p:sp>
-    </p:spTree>
-    <p:extLst>
-      <p:ext uri="{BB962C8B-B14F-4D97-AF65-F5344CB8AC3E}">
-        <p14:creationId xmlns:p14="http://schemas.microsoft.com/office/powerpoint/2010/main" val="2927617128"/>
-      </p:ext>
-    </p:extLst>
-  </p:cSld>
-  <p:clrMapOvr>
-    <a:masterClrMapping/>
-  </p:clrMapOvr>
-  <p:timing>
-    <p:tnLst>
-      <p:par>
-        <p:cTn id="1" dur="indefinite" restart="never" nodeType="tmRoot"/>
-      </p:par>
-    </p:tnLst>
-  </p:timing>
-</p:sld>
-</file>
-
-<file path=ppt/slides/slide6.xml><?xml version="1.0" encoding="utf-8"?>
-<p:sld xmlns:a="http://schemas.openxmlformats.org/drawingml/2006/main" xmlns:r="http://schemas.openxmlformats.org/officeDocument/2006/relationships" xmlns:p="http://schemas.openxmlformats.org/presentationml/2006/main">
-  <p:cSld>
-    <p:spTree>
-      <p:nvGrpSpPr>
-        <p:cNvPr id="1" name=""/>
-        <p:cNvGrpSpPr/>
-        <p:nvPr/>
-      </p:nvGrpSpPr>
-      <p:grpSpPr>
-        <a:xfrm>
-          <a:off x="0" y="0"/>
-          <a:ext cx="0" cy="0"/>
-          <a:chOff x="0" y="0"/>
-          <a:chExt cx="0" cy="0"/>
-        </a:xfrm>
-      </p:grpSpPr>
-      <p:sp>
-        <p:nvSpPr>
-          <p:cNvPr id="2" name="Title 1"/>
-          <p:cNvSpPr>
-            <a:spLocks noGrp="1"/>
-          </p:cNvSpPr>
-          <p:nvPr>
-            <p:ph type="title"/>
-          </p:nvPr>
-        </p:nvSpPr>
-        <p:spPr/>
-        <p:txBody>
-          <a:bodyPr/>
-          <a:lstStyle/>
-          <a:p>
-            <a:r>
-              <a:rPr lang="en-US" dirty="0" smtClean="0"/>
-              <a:t>Question 3.</a:t>
-            </a:r>
-            <a:endParaRPr lang="en-US" dirty="0"/>
-          </a:p>
-        </p:txBody>
-      </p:sp>
-      <p:sp>
-        <p:nvSpPr>
-          <p:cNvPr id="3" name="Content Placeholder 2"/>
-          <p:cNvSpPr>
-            <a:spLocks noGrp="1"/>
-          </p:cNvSpPr>
-          <p:nvPr>
-            <p:ph idx="1"/>
-          </p:nvPr>
-        </p:nvSpPr>
-        <p:spPr/>
-        <p:txBody>
-          <a:bodyPr>
-            <a:normAutofit/>
-          </a:bodyPr>
-          <a:lstStyle/>
-          <a:p>
-            <a:r>
-              <a:rPr lang="en-US" dirty="0"/>
-              <a:t>Here is the last row of the data.</a:t>
-            </a:r>
-          </a:p>
-          <a:p>
-            <a:r>
-              <a:rPr lang="en-US" sz="1400" dirty="0">
-                <a:latin typeface="Courier New" panose="02070309020205020404" pitchFamily="49" charset="0"/>
-                <a:cs typeface="Courier New" panose="02070309020205020404" pitchFamily="49" charset="0"/>
-              </a:rPr>
-              <a:t>&gt; </a:t>
-            </a:r>
-            <a:r>
-              <a:rPr lang="en-US" sz="1400" dirty="0" err="1">
-                <a:latin typeface="Courier New" panose="02070309020205020404" pitchFamily="49" charset="0"/>
-                <a:cs typeface="Courier New" panose="02070309020205020404" pitchFamily="49" charset="0"/>
-              </a:rPr>
-              <a:t>fd</a:t>
-            </a:r>
-            <a:r>
-              <a:rPr lang="en-US" sz="1400" dirty="0">
-                <a:latin typeface="Courier New" panose="02070309020205020404" pitchFamily="49" charset="0"/>
-                <a:cs typeface="Courier New" panose="02070309020205020404" pitchFamily="49" charset="0"/>
-              </a:rPr>
-              <a:t>[252, ]</a:t>
-            </a:r>
-          </a:p>
-          <a:p>
-            <a:r>
-              <a:rPr lang="en-US" sz="1400" dirty="0">
-                <a:latin typeface="Courier New" panose="02070309020205020404" pitchFamily="49" charset="0"/>
-                <a:cs typeface="Courier New" panose="02070309020205020404" pitchFamily="49" charset="0"/>
-              </a:rPr>
-              <a:t>    case </a:t>
-            </a:r>
-            <a:r>
-              <a:rPr lang="en-US" sz="1400" dirty="0" err="1">
-                <a:latin typeface="Courier New" panose="02070309020205020404" pitchFamily="49" charset="0"/>
-                <a:cs typeface="Courier New" panose="02070309020205020404" pitchFamily="49" charset="0"/>
-              </a:rPr>
-              <a:t>fat.b</a:t>
-            </a:r>
-            <a:r>
-              <a:rPr lang="en-US" sz="1400" dirty="0">
-                <a:latin typeface="Courier New" panose="02070309020205020404" pitchFamily="49" charset="0"/>
-                <a:cs typeface="Courier New" panose="02070309020205020404" pitchFamily="49" charset="0"/>
-              </a:rPr>
-              <a:t> </a:t>
-            </a:r>
-            <a:r>
-              <a:rPr lang="en-US" sz="1400" dirty="0" err="1">
-                <a:latin typeface="Courier New" panose="02070309020205020404" pitchFamily="49" charset="0"/>
-                <a:cs typeface="Courier New" panose="02070309020205020404" pitchFamily="49" charset="0"/>
-              </a:rPr>
-              <a:t>fat.s</a:t>
-            </a:r>
-            <a:r>
-              <a:rPr lang="en-US" sz="1400" dirty="0">
-                <a:latin typeface="Courier New" panose="02070309020205020404" pitchFamily="49" charset="0"/>
-                <a:cs typeface="Courier New" panose="02070309020205020404" pitchFamily="49" charset="0"/>
-              </a:rPr>
-              <a:t>   dens age    </a:t>
-            </a:r>
-            <a:r>
-              <a:rPr lang="en-US" sz="1400" dirty="0" err="1">
-                <a:latin typeface="Courier New" panose="02070309020205020404" pitchFamily="49" charset="0"/>
-                <a:cs typeface="Courier New" panose="02070309020205020404" pitchFamily="49" charset="0"/>
-              </a:rPr>
-              <a:t>wt</a:t>
-            </a:r>
-            <a:r>
-              <a:rPr lang="en-US" sz="1400" dirty="0">
-                <a:latin typeface="Courier New" panose="02070309020205020404" pitchFamily="49" charset="0"/>
-                <a:cs typeface="Courier New" panose="02070309020205020404" pitchFamily="49" charset="0"/>
-              </a:rPr>
-              <a:t> </a:t>
-            </a:r>
-            <a:r>
-              <a:rPr lang="en-US" sz="1400" dirty="0" err="1">
-                <a:latin typeface="Courier New" panose="02070309020205020404" pitchFamily="49" charset="0"/>
-                <a:cs typeface="Courier New" panose="02070309020205020404" pitchFamily="49" charset="0"/>
-              </a:rPr>
-              <a:t>ht</a:t>
-            </a:r>
-            <a:r>
-              <a:rPr lang="en-US" sz="1400" dirty="0">
-                <a:latin typeface="Courier New" panose="02070309020205020404" pitchFamily="49" charset="0"/>
-                <a:cs typeface="Courier New" panose="02070309020205020404" pitchFamily="49" charset="0"/>
-              </a:rPr>
-              <a:t>  </a:t>
-            </a:r>
-            <a:r>
-              <a:rPr lang="en-US" sz="1400" dirty="0" err="1">
-                <a:latin typeface="Courier New" panose="02070309020205020404" pitchFamily="49" charset="0"/>
-                <a:cs typeface="Courier New" panose="02070309020205020404" pitchFamily="49" charset="0"/>
-              </a:rPr>
-              <a:t>bmi</a:t>
-            </a:r>
-            <a:r>
-              <a:rPr lang="en-US" sz="1400" dirty="0">
-                <a:latin typeface="Courier New" panose="02070309020205020404" pitchFamily="49" charset="0"/>
-                <a:cs typeface="Courier New" panose="02070309020205020404" pitchFamily="49" charset="0"/>
-              </a:rPr>
-              <a:t>   </a:t>
-            </a:r>
-            <a:r>
-              <a:rPr lang="en-US" sz="1400" dirty="0" err="1">
-                <a:latin typeface="Courier New" panose="02070309020205020404" pitchFamily="49" charset="0"/>
-                <a:cs typeface="Courier New" panose="02070309020205020404" pitchFamily="49" charset="0"/>
-              </a:rPr>
-              <a:t>ffw</a:t>
-            </a:r>
-            <a:r>
-              <a:rPr lang="en-US" sz="1400" dirty="0">
-                <a:latin typeface="Courier New" panose="02070309020205020404" pitchFamily="49" charset="0"/>
-                <a:cs typeface="Courier New" panose="02070309020205020404" pitchFamily="49" charset="0"/>
-              </a:rPr>
-              <a:t> neck chest abdomen</a:t>
-            </a:r>
-          </a:p>
-          <a:p>
-            <a:r>
-              <a:rPr lang="en-US" sz="1400" dirty="0">
-                <a:latin typeface="Courier New" panose="02070309020205020404" pitchFamily="49" charset="0"/>
-                <a:cs typeface="Courier New" panose="02070309020205020404" pitchFamily="49" charset="0"/>
-              </a:rPr>
-              <a:t>252  252  30.7  31.9 1.0271  74 207.5 70 29.8 143.7 40.8 112.4   108.5</a:t>
-            </a:r>
-          </a:p>
-          <a:p>
-            <a:r>
-              <a:rPr lang="en-US" sz="1400" dirty="0">
-                <a:latin typeface="Courier New" panose="02070309020205020404" pitchFamily="49" charset="0"/>
-                <a:cs typeface="Courier New" panose="02070309020205020404" pitchFamily="49" charset="0"/>
-              </a:rPr>
-              <a:t>      hip thigh knee ankle biceps forearm wrist</a:t>
-            </a:r>
-          </a:p>
-          <a:p>
-            <a:r>
-              <a:rPr lang="en-US" sz="1400" dirty="0">
-                <a:latin typeface="Courier New" panose="02070309020205020404" pitchFamily="49" charset="0"/>
-                <a:cs typeface="Courier New" panose="02070309020205020404" pitchFamily="49" charset="0"/>
-              </a:rPr>
-              <a:t>252 107.1  59.3 42.2  24.6   33.7      30  20.9</a:t>
-            </a:r>
-          </a:p>
-          <a:p>
-            <a:endParaRPr lang="en-US" dirty="0"/>
-          </a:p>
-        </p:txBody>
-      </p:sp>
-    </p:spTree>
-    <p:extLst>
-      <p:ext uri="{BB962C8B-B14F-4D97-AF65-F5344CB8AC3E}">
-        <p14:creationId xmlns:p14="http://schemas.microsoft.com/office/powerpoint/2010/main" val="2424123970"/>
-      </p:ext>
-    </p:extLst>
-  </p:cSld>
-  <p:clrMapOvr>
-    <a:masterClrMapping/>
-  </p:clrMapOvr>
-  <p:timing>
-    <p:tnLst>
-      <p:par>
-        <p:cTn id="1" dur="indefinite" restart="never" nodeType="tmRoot"/>
-      </p:par>
-    </p:tnLst>
-  </p:timing>
-</p:sld>
-</file>
-
-<file path=ppt/slides/slide7.xml><?xml version="1.0" encoding="utf-8"?>
-<p:sld xmlns:a="http://schemas.openxmlformats.org/drawingml/2006/main" xmlns:r="http://schemas.openxmlformats.org/officeDocument/2006/relationships" xmlns:p="http://schemas.openxmlformats.org/presentationml/2006/main">
-  <p:cSld>
-    <p:spTree>
-      <p:nvGrpSpPr>
-        <p:cNvPr id="1" name=""/>
-        <p:cNvGrpSpPr/>
-        <p:nvPr/>
-      </p:nvGrpSpPr>
-      <p:grpSpPr>
-        <a:xfrm>
-          <a:off x="0" y="0"/>
-          <a:ext cx="0" cy="0"/>
-          <a:chOff x="0" y="0"/>
-          <a:chExt cx="0" cy="0"/>
-        </a:xfrm>
-      </p:grpSpPr>
-      <p:sp>
-        <p:nvSpPr>
-          <p:cNvPr id="2" name="Title 1"/>
-          <p:cNvSpPr>
-            <a:spLocks noGrp="1"/>
-          </p:cNvSpPr>
-          <p:nvPr>
-            <p:ph type="title"/>
-          </p:nvPr>
-        </p:nvSpPr>
-        <p:spPr/>
-        <p:txBody>
-          <a:bodyPr/>
-          <a:lstStyle/>
-          <a:p>
-            <a:r>
-              <a:rPr lang="en-US" dirty="0" smtClean="0"/>
-              <a:t>Question 4.</a:t>
-            </a:r>
-            <a:endParaRPr lang="en-US" dirty="0"/>
-          </a:p>
-        </p:txBody>
-      </p:sp>
-      <p:sp>
-        <p:nvSpPr>
-          <p:cNvPr id="3" name="Content Placeholder 2"/>
-          <p:cNvSpPr>
-            <a:spLocks noGrp="1"/>
-          </p:cNvSpPr>
-          <p:nvPr>
-            <p:ph idx="1"/>
-          </p:nvPr>
-        </p:nvSpPr>
-        <p:spPr/>
-        <p:txBody>
-          <a:bodyPr>
-            <a:normAutofit fontScale="92500" lnSpcReduction="10000"/>
-          </a:bodyPr>
-          <a:lstStyle/>
-          <a:p>
-            <a:r>
-              <a:rPr lang="en-US" sz="3800" dirty="0" smtClean="0"/>
-              <a:t>Here </a:t>
-            </a:r>
-            <a:r>
-              <a:rPr lang="en-US" sz="3800" dirty="0"/>
-              <a:t>is a summary for </a:t>
-            </a:r>
-            <a:r>
-              <a:rPr lang="en-US" sz="3800" dirty="0" err="1"/>
-              <a:t>bmi</a:t>
-            </a:r>
-            <a:r>
-              <a:rPr lang="en-US" sz="3800" dirty="0"/>
-              <a:t>.</a:t>
-            </a:r>
-          </a:p>
-          <a:p>
-            <a:r>
-              <a:rPr lang="en-US" sz="2200" dirty="0">
-                <a:latin typeface="Courier New" panose="02070309020205020404" pitchFamily="49" charset="0"/>
-                <a:cs typeface="Courier New" panose="02070309020205020404" pitchFamily="49" charset="0"/>
-              </a:rPr>
-              <a:t>&gt; summary(</a:t>
-            </a:r>
-            <a:r>
-              <a:rPr lang="en-US" sz="2200" dirty="0" err="1">
-                <a:latin typeface="Courier New" panose="02070309020205020404" pitchFamily="49" charset="0"/>
-                <a:cs typeface="Courier New" panose="02070309020205020404" pitchFamily="49" charset="0"/>
-              </a:rPr>
-              <a:t>fd$bmi</a:t>
-            </a:r>
-            <a:r>
-              <a:rPr lang="en-US" sz="2200" dirty="0">
-                <a:latin typeface="Courier New" panose="02070309020205020404" pitchFamily="49" charset="0"/>
-                <a:cs typeface="Courier New" panose="02070309020205020404" pitchFamily="49" charset="0"/>
-              </a:rPr>
-              <a:t>)</a:t>
-            </a:r>
-          </a:p>
-          <a:p>
-            <a:r>
-              <a:rPr lang="en-US" sz="2200" dirty="0">
-                <a:latin typeface="Courier New" panose="02070309020205020404" pitchFamily="49" charset="0"/>
-                <a:cs typeface="Courier New" panose="02070309020205020404" pitchFamily="49" charset="0"/>
-              </a:rPr>
-              <a:t>   Min. 1st Qu.  Median    Mean 3rd Qu.    Max. </a:t>
-            </a:r>
-          </a:p>
-          <a:p>
-            <a:r>
-              <a:rPr lang="en-US" sz="2200" dirty="0">
-                <a:latin typeface="Courier New" panose="02070309020205020404" pitchFamily="49" charset="0"/>
-                <a:cs typeface="Courier New" panose="02070309020205020404" pitchFamily="49" charset="0"/>
-              </a:rPr>
-              <a:t>  18.10   23.10   25.05   25.44   27.33   48.90</a:t>
-            </a:r>
-          </a:p>
-          <a:p>
-            <a:r>
-              <a:rPr lang="en-US" sz="3500" dirty="0"/>
-              <a:t>[[NOTE: INTERPRETATION IS IMPORTANT, BOTH HERE AND FOR THE NEXT TWO QUESTIONS. You don’t have to describe every single number, just pick two or three to talk about.]] Rounding to two significant figures, the mean is 25, the range is 18 to 49.</a:t>
-            </a:r>
-          </a:p>
-          <a:p>
-            <a:endParaRPr lang="en-US" dirty="0"/>
-          </a:p>
-        </p:txBody>
-      </p:sp>
-    </p:spTree>
-    <p:extLst>
-      <p:ext uri="{BB962C8B-B14F-4D97-AF65-F5344CB8AC3E}">
-        <p14:creationId xmlns:p14="http://schemas.microsoft.com/office/powerpoint/2010/main" val="3625455227"/>
-      </p:ext>
-    </p:extLst>
-  </p:cSld>
-  <p:clrMapOvr>
-    <a:masterClrMapping/>
-  </p:clrMapOvr>
-  <p:timing>
-    <p:tnLst>
-      <p:par>
-        <p:cTn id="1" dur="indefinite" restart="never" nodeType="tmRoot"/>
-      </p:par>
-    </p:tnLst>
-  </p:timing>
-</p:sld>
-</file>
-
-<file path=ppt/slides/slide8.xml><?xml version="1.0" encoding="utf-8"?>
+<file path=ppt/slides/slide10.xml><?xml version="1.0" encoding="utf-8"?>
 <p:sld xmlns:a="http://schemas.openxmlformats.org/drawingml/2006/main" xmlns:r="http://schemas.openxmlformats.org/officeDocument/2006/relationships" xmlns:p="http://schemas.openxmlformats.org/presentationml/2006/main">
   <p:cSld>
     <p:spTree>
@@ -4694,6 +3378,1768 @@
 </p:sld>
 </file>
 
+<file path=ppt/slides/slide11.xml><?xml version="1.0" encoding="utf-8"?>
+<p:sld xmlns:a="http://schemas.openxmlformats.org/drawingml/2006/main" xmlns:r="http://schemas.openxmlformats.org/officeDocument/2006/relationships" xmlns:p="http://schemas.openxmlformats.org/presentationml/2006/main">
+  <p:cSld>
+    <p:spTree>
+      <p:nvGrpSpPr>
+        <p:cNvPr id="1" name=""/>
+        <p:cNvGrpSpPr/>
+        <p:nvPr/>
+      </p:nvGrpSpPr>
+      <p:grpSpPr>
+        <a:xfrm>
+          <a:off x="0" y="0"/>
+          <a:ext cx="0" cy="0"/>
+          <a:chOff x="0" y="0"/>
+          <a:chExt cx="0" cy="0"/>
+        </a:xfrm>
+      </p:grpSpPr>
+      <p:sp>
+        <p:nvSpPr>
+          <p:cNvPr id="5" name="Title 4"/>
+          <p:cNvSpPr>
+            <a:spLocks noGrp="1"/>
+          </p:cNvSpPr>
+          <p:nvPr>
+            <p:ph type="title"/>
+          </p:nvPr>
+        </p:nvSpPr>
+        <p:spPr/>
+        <p:txBody>
+          <a:bodyPr/>
+          <a:lstStyle/>
+          <a:p>
+            <a:r>
+              <a:rPr lang="en-US" dirty="0" smtClean="0"/>
+              <a:t>Question 6.</a:t>
+            </a:r>
+            <a:endParaRPr lang="en-US" dirty="0"/>
+          </a:p>
+        </p:txBody>
+      </p:sp>
+      <p:sp>
+        <p:nvSpPr>
+          <p:cNvPr id="6" name="Content Placeholder 5"/>
+          <p:cNvSpPr>
+            <a:spLocks noGrp="1"/>
+          </p:cNvSpPr>
+          <p:nvPr>
+            <p:ph idx="1"/>
+          </p:nvPr>
+        </p:nvSpPr>
+        <p:spPr/>
+        <p:txBody>
+          <a:bodyPr/>
+          <a:lstStyle/>
+          <a:p>
+            <a:r>
+              <a:rPr lang="en-US" dirty="0"/>
+              <a:t>Here is a correlation between </a:t>
+            </a:r>
+            <a:r>
+              <a:rPr lang="en-US" dirty="0" err="1"/>
+              <a:t>bmi</a:t>
+            </a:r>
+            <a:r>
+              <a:rPr lang="en-US" dirty="0"/>
+              <a:t> and age.</a:t>
+            </a:r>
+          </a:p>
+          <a:p>
+            <a:r>
+              <a:rPr lang="en-US" dirty="0">
+                <a:latin typeface="Courier New" panose="02070309020205020404" pitchFamily="49" charset="0"/>
+                <a:cs typeface="Courier New" panose="02070309020205020404" pitchFamily="49" charset="0"/>
+              </a:rPr>
+              <a:t>&gt; </a:t>
+            </a:r>
+            <a:r>
+              <a:rPr lang="en-US" dirty="0" err="1">
+                <a:latin typeface="Courier New" panose="02070309020205020404" pitchFamily="49" charset="0"/>
+                <a:cs typeface="Courier New" panose="02070309020205020404" pitchFamily="49" charset="0"/>
+              </a:rPr>
+              <a:t>cor</a:t>
+            </a:r>
+            <a:r>
+              <a:rPr lang="en-US" dirty="0">
+                <a:latin typeface="Courier New" panose="02070309020205020404" pitchFamily="49" charset="0"/>
+                <a:cs typeface="Courier New" panose="02070309020205020404" pitchFamily="49" charset="0"/>
+              </a:rPr>
+              <a:t>(</a:t>
+            </a:r>
+            <a:r>
+              <a:rPr lang="en-US" dirty="0" err="1">
+                <a:latin typeface="Courier New" panose="02070309020205020404" pitchFamily="49" charset="0"/>
+                <a:cs typeface="Courier New" panose="02070309020205020404" pitchFamily="49" charset="0"/>
+              </a:rPr>
+              <a:t>fd$bmi</a:t>
+            </a:r>
+            <a:r>
+              <a:rPr lang="en-US" dirty="0">
+                <a:latin typeface="Courier New" panose="02070309020205020404" pitchFamily="49" charset="0"/>
+                <a:cs typeface="Courier New" panose="02070309020205020404" pitchFamily="49" charset="0"/>
+              </a:rPr>
+              <a:t>, </a:t>
+            </a:r>
+            <a:r>
+              <a:rPr lang="en-US" dirty="0" err="1">
+                <a:latin typeface="Courier New" panose="02070309020205020404" pitchFamily="49" charset="0"/>
+                <a:cs typeface="Courier New" panose="02070309020205020404" pitchFamily="49" charset="0"/>
+              </a:rPr>
+              <a:t>fd$age</a:t>
+            </a:r>
+            <a:r>
+              <a:rPr lang="en-US" dirty="0">
+                <a:latin typeface="Courier New" panose="02070309020205020404" pitchFamily="49" charset="0"/>
+                <a:cs typeface="Courier New" panose="02070309020205020404" pitchFamily="49" charset="0"/>
+              </a:rPr>
+              <a:t>)</a:t>
+            </a:r>
+          </a:p>
+          <a:p>
+            <a:r>
+              <a:rPr lang="en-US" dirty="0">
+                <a:latin typeface="Courier New" panose="02070309020205020404" pitchFamily="49" charset="0"/>
+                <a:cs typeface="Courier New" panose="02070309020205020404" pitchFamily="49" charset="0"/>
+              </a:rPr>
+              <a:t>[1] 0.1188513</a:t>
+            </a:r>
+          </a:p>
+          <a:p>
+            <a:r>
+              <a:rPr lang="en-US" dirty="0"/>
+              <a:t>The correlation is 0.12. There is little or no association between </a:t>
+            </a:r>
+            <a:r>
+              <a:rPr lang="en-US" dirty="0" err="1"/>
+              <a:t>bmi</a:t>
+            </a:r>
+            <a:r>
+              <a:rPr lang="en-US" dirty="0"/>
+              <a:t> and age</a:t>
+            </a:r>
+            <a:r>
+              <a:rPr lang="en-US" dirty="0" smtClean="0"/>
+              <a:t>.</a:t>
+            </a:r>
+            <a:endParaRPr lang="en-US" dirty="0"/>
+          </a:p>
+        </p:txBody>
+      </p:sp>
+    </p:spTree>
+    <p:extLst>
+      <p:ext uri="{BB962C8B-B14F-4D97-AF65-F5344CB8AC3E}">
+        <p14:creationId xmlns:p14="http://schemas.microsoft.com/office/powerpoint/2010/main" val="4250499533"/>
+      </p:ext>
+    </p:extLst>
+  </p:cSld>
+  <p:clrMapOvr>
+    <a:masterClrMapping/>
+  </p:clrMapOvr>
+  <p:timing>
+    <p:tnLst>
+      <p:par>
+        <p:cTn id="1" dur="indefinite" restart="never" nodeType="tmRoot"/>
+      </p:par>
+    </p:tnLst>
+  </p:timing>
+</p:sld>
+</file>
+
+<file path=ppt/slides/slide12.xml><?xml version="1.0" encoding="utf-8"?>
+<p:sld xmlns:a="http://schemas.openxmlformats.org/drawingml/2006/main" xmlns:r="http://schemas.openxmlformats.org/officeDocument/2006/relationships" xmlns:p="http://schemas.openxmlformats.org/presentationml/2006/main">
+  <p:cSld>
+    <p:spTree>
+      <p:nvGrpSpPr>
+        <p:cNvPr id="1" name=""/>
+        <p:cNvGrpSpPr/>
+        <p:nvPr/>
+      </p:nvGrpSpPr>
+      <p:grpSpPr>
+        <a:xfrm>
+          <a:off x="0" y="0"/>
+          <a:ext cx="0" cy="0"/>
+          <a:chOff x="0" y="0"/>
+          <a:chExt cx="0" cy="0"/>
+        </a:xfrm>
+      </p:grpSpPr>
+      <p:sp>
+        <p:nvSpPr>
+          <p:cNvPr id="2" name="Title 1"/>
+          <p:cNvSpPr>
+            <a:spLocks noGrp="1"/>
+          </p:cNvSpPr>
+          <p:nvPr>
+            <p:ph type="title"/>
+          </p:nvPr>
+        </p:nvSpPr>
+        <p:spPr/>
+        <p:txBody>
+          <a:bodyPr/>
+          <a:lstStyle/>
+          <a:p>
+            <a:r>
+              <a:rPr lang="en-US" dirty="0" smtClean="0"/>
+              <a:t>Concluding remarks</a:t>
+            </a:r>
+            <a:endParaRPr lang="en-US" dirty="0"/>
+          </a:p>
+        </p:txBody>
+      </p:sp>
+      <p:sp>
+        <p:nvSpPr>
+          <p:cNvPr id="3" name="Content Placeholder 2"/>
+          <p:cNvSpPr>
+            <a:spLocks noGrp="1"/>
+          </p:cNvSpPr>
+          <p:nvPr>
+            <p:ph idx="1"/>
+          </p:nvPr>
+        </p:nvSpPr>
+        <p:spPr/>
+        <p:txBody>
+          <a:bodyPr>
+            <a:normAutofit/>
+          </a:bodyPr>
+          <a:lstStyle/>
+          <a:p>
+            <a:r>
+              <a:rPr lang="en-US" sz="3600" dirty="0" smtClean="0"/>
+              <a:t>What </a:t>
+            </a:r>
+            <a:r>
+              <a:rPr lang="en-US" sz="3600" dirty="0"/>
+              <a:t>you see here is only a suggestion. Feel free to create a format that you like. The three things I am looking for </a:t>
+            </a:r>
+            <a:r>
+              <a:rPr lang="en-US" sz="3600" dirty="0" smtClean="0"/>
+              <a:t>are</a:t>
+            </a:r>
+          </a:p>
+          <a:p>
+            <a:pPr marL="971550" lvl="1" indent="-514350">
+              <a:buFont typeface="+mj-lt"/>
+              <a:buAutoNum type="arabicPeriod"/>
+            </a:pPr>
+            <a:r>
+              <a:rPr lang="en-US" sz="3200" dirty="0" smtClean="0"/>
+              <a:t>a </a:t>
+            </a:r>
+            <a:r>
+              <a:rPr lang="en-US" sz="3200" dirty="0"/>
+              <a:t>listing of the R commands that you used</a:t>
+            </a:r>
+            <a:r>
+              <a:rPr lang="en-US" sz="3200" dirty="0" smtClean="0"/>
+              <a:t>,</a:t>
+            </a:r>
+          </a:p>
+          <a:p>
+            <a:pPr marL="971550" lvl="1" indent="-514350">
+              <a:buFont typeface="+mj-lt"/>
+              <a:buAutoNum type="arabicPeriod"/>
+            </a:pPr>
+            <a:r>
+              <a:rPr lang="en-US" sz="3200" dirty="0" smtClean="0"/>
+              <a:t>the </a:t>
+            </a:r>
+            <a:r>
+              <a:rPr lang="en-US" sz="3200" dirty="0"/>
+              <a:t>text or graphical output, and </a:t>
+            </a:r>
+            <a:endParaRPr lang="en-US" sz="3200" dirty="0" smtClean="0"/>
+          </a:p>
+          <a:p>
+            <a:pPr marL="971550" lvl="1" indent="-514350">
+              <a:buFont typeface="+mj-lt"/>
+              <a:buAutoNum type="arabicPeriod"/>
+            </a:pPr>
+            <a:r>
+              <a:rPr lang="en-US" sz="3200" dirty="0" smtClean="0"/>
+              <a:t>a </a:t>
+            </a:r>
+            <a:r>
+              <a:rPr lang="en-US" sz="3200" dirty="0"/>
+              <a:t>brief interpretation.</a:t>
+            </a:r>
+          </a:p>
+        </p:txBody>
+      </p:sp>
+    </p:spTree>
+    <p:extLst>
+      <p:ext uri="{BB962C8B-B14F-4D97-AF65-F5344CB8AC3E}">
+        <p14:creationId xmlns:p14="http://schemas.microsoft.com/office/powerpoint/2010/main" val="3329298029"/>
+      </p:ext>
+    </p:extLst>
+  </p:cSld>
+  <p:clrMapOvr>
+    <a:masterClrMapping/>
+  </p:clrMapOvr>
+  <p:timing>
+    <p:tnLst>
+      <p:par>
+        <p:cTn id="1" dur="indefinite" restart="never" nodeType="tmRoot"/>
+      </p:par>
+    </p:tnLst>
+  </p:timing>
+</p:sld>
+</file>
+
+<file path=ppt/slides/slide2.xml><?xml version="1.0" encoding="utf-8"?>
+<p:sld xmlns:a="http://schemas.openxmlformats.org/drawingml/2006/main" xmlns:r="http://schemas.openxmlformats.org/officeDocument/2006/relationships" xmlns:p="http://schemas.openxmlformats.org/presentationml/2006/main">
+  <p:cSld>
+    <p:spTree>
+      <p:nvGrpSpPr>
+        <p:cNvPr id="1" name=""/>
+        <p:cNvGrpSpPr/>
+        <p:nvPr/>
+      </p:nvGrpSpPr>
+      <p:grpSpPr>
+        <a:xfrm>
+          <a:off x="0" y="0"/>
+          <a:ext cx="0" cy="0"/>
+          <a:chOff x="0" y="0"/>
+          <a:chExt cx="0" cy="0"/>
+        </a:xfrm>
+      </p:grpSpPr>
+      <p:sp>
+        <p:nvSpPr>
+          <p:cNvPr id="2" name="Title 1"/>
+          <p:cNvSpPr>
+            <a:spLocks noGrp="1"/>
+          </p:cNvSpPr>
+          <p:nvPr>
+            <p:ph type="title"/>
+          </p:nvPr>
+        </p:nvSpPr>
+        <p:spPr/>
+        <p:txBody>
+          <a:bodyPr>
+            <a:normAutofit fontScale="90000"/>
+          </a:bodyPr>
+          <a:lstStyle/>
+          <a:p>
+            <a:r>
+              <a:rPr lang="en-US" dirty="0" smtClean="0"/>
+              <a:t>What should you turn in for homework?</a:t>
+            </a:r>
+            <a:endParaRPr lang="en-US" dirty="0"/>
+          </a:p>
+        </p:txBody>
+      </p:sp>
+      <p:sp>
+        <p:nvSpPr>
+          <p:cNvPr id="3" name="Content Placeholder 2"/>
+          <p:cNvSpPr>
+            <a:spLocks noGrp="1"/>
+          </p:cNvSpPr>
+          <p:nvPr>
+            <p:ph idx="1"/>
+          </p:nvPr>
+        </p:nvSpPr>
+        <p:spPr/>
+        <p:txBody>
+          <a:bodyPr/>
+          <a:lstStyle/>
+          <a:p>
+            <a:r>
+              <a:rPr lang="en-US" dirty="0" smtClean="0"/>
+              <a:t>I had a student ask, “What, exactly, do I need to turn in for the homework assignments. I said that I’d like to see the R commands, the R output, and a brief commentary. Then I realized that it might be helpful to see a real example. So I made up a simple homework assignment to illustrate what I’m looking for.</a:t>
+            </a:r>
+            <a:endParaRPr lang="en-US" dirty="0"/>
+          </a:p>
+        </p:txBody>
+      </p:sp>
+    </p:spTree>
+    <p:extLst>
+      <p:ext uri="{BB962C8B-B14F-4D97-AF65-F5344CB8AC3E}">
+        <p14:creationId xmlns:p14="http://schemas.microsoft.com/office/powerpoint/2010/main" val="589188993"/>
+      </p:ext>
+    </p:extLst>
+  </p:cSld>
+  <p:clrMapOvr>
+    <a:masterClrMapping/>
+  </p:clrMapOvr>
+  <p:timing>
+    <p:tnLst>
+      <p:par>
+        <p:cTn id="1" dur="indefinite" restart="never" nodeType="tmRoot"/>
+      </p:par>
+    </p:tnLst>
+  </p:timing>
+</p:sld>
+</file>
+
+<file path=ppt/slides/slide3.xml><?xml version="1.0" encoding="utf-8"?>
+<p:sld xmlns:a="http://schemas.openxmlformats.org/drawingml/2006/main" xmlns:r="http://schemas.openxmlformats.org/officeDocument/2006/relationships" xmlns:p="http://schemas.openxmlformats.org/presentationml/2006/main">
+  <p:cSld>
+    <p:spTree>
+      <p:nvGrpSpPr>
+        <p:cNvPr id="1" name=""/>
+        <p:cNvGrpSpPr/>
+        <p:nvPr/>
+      </p:nvGrpSpPr>
+      <p:grpSpPr>
+        <a:xfrm>
+          <a:off x="0" y="0"/>
+          <a:ext cx="0" cy="0"/>
+          <a:chOff x="0" y="0"/>
+          <a:chExt cx="0" cy="0"/>
+        </a:xfrm>
+      </p:grpSpPr>
+      <p:sp>
+        <p:nvSpPr>
+          <p:cNvPr id="2" name="Title 1"/>
+          <p:cNvSpPr>
+            <a:spLocks noGrp="1"/>
+          </p:cNvSpPr>
+          <p:nvPr>
+            <p:ph type="title"/>
+          </p:nvPr>
+        </p:nvSpPr>
+        <p:spPr/>
+        <p:txBody>
+          <a:bodyPr>
+            <a:normAutofit fontScale="90000"/>
+          </a:bodyPr>
+          <a:lstStyle/>
+          <a:p>
+            <a:r>
+              <a:rPr lang="en-US" dirty="0" smtClean="0"/>
+              <a:t>Here’s the simple homework assignment</a:t>
+            </a:r>
+            <a:endParaRPr lang="en-US" dirty="0"/>
+          </a:p>
+        </p:txBody>
+      </p:sp>
+      <p:sp>
+        <p:nvSpPr>
+          <p:cNvPr id="3" name="Content Placeholder 2"/>
+          <p:cNvSpPr>
+            <a:spLocks noGrp="1"/>
+          </p:cNvSpPr>
+          <p:nvPr>
+            <p:ph idx="1"/>
+          </p:nvPr>
+        </p:nvSpPr>
+        <p:spPr/>
+        <p:txBody>
+          <a:bodyPr>
+            <a:normAutofit fontScale="40000" lnSpcReduction="20000"/>
+          </a:bodyPr>
+          <a:lstStyle/>
+          <a:p>
+            <a:r>
+              <a:rPr lang="en-US" sz="5100" dirty="0"/>
+              <a:t>1. Read in the data on various body measurements. A description is at</a:t>
+            </a:r>
+          </a:p>
+          <a:p>
+            <a:r>
+              <a:rPr lang="en-US" sz="5100" dirty="0"/>
+              <a:t>--&gt; http://www.amstat.org/publications/jse/datasets/fat.txt</a:t>
+            </a:r>
+          </a:p>
+          <a:p>
+            <a:r>
+              <a:rPr lang="en-US" sz="5100" dirty="0"/>
+              <a:t>and the file can be found at </a:t>
+            </a:r>
+          </a:p>
+          <a:p>
+            <a:r>
+              <a:rPr lang="en-US" sz="5100" dirty="0"/>
+              <a:t>--&gt; http://www.amstat.org/publications/jse/datasets/fat.dat.txt</a:t>
+            </a:r>
+          </a:p>
+          <a:p>
+            <a:r>
+              <a:rPr lang="en-US" sz="5100" dirty="0"/>
+              <a:t>Display the first few rows and the last few rows of the data</a:t>
+            </a:r>
+            <a:r>
+              <a:rPr lang="en-US" sz="5100" dirty="0" smtClean="0"/>
+              <a:t>.</a:t>
+            </a:r>
+            <a:endParaRPr lang="en-US" sz="5100" dirty="0"/>
+          </a:p>
+          <a:p>
+            <a:r>
+              <a:rPr lang="en-US" sz="5100" dirty="0"/>
+              <a:t>2. List all of the </a:t>
+            </a:r>
+            <a:r>
+              <a:rPr lang="en-US" sz="5100" dirty="0" err="1"/>
+              <a:t>bmi</a:t>
+            </a:r>
+            <a:r>
+              <a:rPr lang="en-US" sz="5100" dirty="0"/>
+              <a:t> values</a:t>
+            </a:r>
+            <a:r>
+              <a:rPr lang="en-US" sz="5100" dirty="0" smtClean="0"/>
+              <a:t>.</a:t>
+            </a:r>
+            <a:endParaRPr lang="en-US" sz="5100" dirty="0"/>
+          </a:p>
+          <a:p>
+            <a:r>
+              <a:rPr lang="en-US" sz="5100" dirty="0"/>
+              <a:t>3. List the last row of the data set only</a:t>
+            </a:r>
+            <a:r>
+              <a:rPr lang="en-US" sz="5100" dirty="0" smtClean="0"/>
+              <a:t>.</a:t>
+            </a:r>
+            <a:endParaRPr lang="en-US" sz="5100" dirty="0"/>
+          </a:p>
+          <a:p>
+            <a:r>
+              <a:rPr lang="en-US" sz="5100" dirty="0"/>
+              <a:t>4. Calculate a summary for </a:t>
+            </a:r>
+            <a:r>
+              <a:rPr lang="en-US" sz="5100" dirty="0" err="1"/>
+              <a:t>bmi</a:t>
+            </a:r>
+            <a:r>
+              <a:rPr lang="en-US" sz="5100" dirty="0" smtClean="0"/>
+              <a:t>.</a:t>
+            </a:r>
+            <a:endParaRPr lang="en-US" sz="5100" dirty="0"/>
+          </a:p>
+          <a:p>
+            <a:r>
+              <a:rPr lang="en-US" sz="5100" dirty="0"/>
+              <a:t>5. Draw a histogram for </a:t>
+            </a:r>
+            <a:r>
+              <a:rPr lang="en-US" sz="5100" dirty="0" err="1"/>
+              <a:t>bmi</a:t>
+            </a:r>
+            <a:r>
+              <a:rPr lang="en-US" sz="5100" dirty="0"/>
+              <a:t> and interpret it</a:t>
+            </a:r>
+            <a:r>
+              <a:rPr lang="en-US" sz="5100" dirty="0" smtClean="0"/>
+              <a:t>.</a:t>
+            </a:r>
+            <a:endParaRPr lang="en-US" sz="5100" dirty="0"/>
+          </a:p>
+          <a:p>
+            <a:r>
+              <a:rPr lang="en-US" sz="5100" dirty="0"/>
+              <a:t>6. Show the association between age and </a:t>
+            </a:r>
+            <a:r>
+              <a:rPr lang="en-US" sz="5100" dirty="0" err="1"/>
+              <a:t>bmi</a:t>
+            </a:r>
+            <a:r>
+              <a:rPr lang="en-US" sz="5100" dirty="0"/>
+              <a:t> using a correlation.</a:t>
+            </a:r>
+          </a:p>
+          <a:p>
+            <a:endParaRPr lang="en-US" dirty="0"/>
+          </a:p>
+        </p:txBody>
+      </p:sp>
+    </p:spTree>
+    <p:extLst>
+      <p:ext uri="{BB962C8B-B14F-4D97-AF65-F5344CB8AC3E}">
+        <p14:creationId xmlns:p14="http://schemas.microsoft.com/office/powerpoint/2010/main" val="1637319884"/>
+      </p:ext>
+    </p:extLst>
+  </p:cSld>
+  <p:clrMapOvr>
+    <a:masterClrMapping/>
+  </p:clrMapOvr>
+  <p:timing>
+    <p:tnLst>
+      <p:par>
+        <p:cTn id="1" dur="indefinite" restart="never" nodeType="tmRoot"/>
+      </p:par>
+    </p:tnLst>
+  </p:timing>
+</p:sld>
+</file>
+
+<file path=ppt/slides/slide4.xml><?xml version="1.0" encoding="utf-8"?>
+<p:sld xmlns:a="http://schemas.openxmlformats.org/drawingml/2006/main" xmlns:r="http://schemas.openxmlformats.org/officeDocument/2006/relationships" xmlns:p="http://schemas.openxmlformats.org/presentationml/2006/main">
+  <p:cSld>
+    <p:spTree>
+      <p:nvGrpSpPr>
+        <p:cNvPr id="1" name=""/>
+        <p:cNvGrpSpPr/>
+        <p:nvPr/>
+      </p:nvGrpSpPr>
+      <p:grpSpPr>
+        <a:xfrm>
+          <a:off x="0" y="0"/>
+          <a:ext cx="0" cy="0"/>
+          <a:chOff x="0" y="0"/>
+          <a:chExt cx="0" cy="0"/>
+        </a:xfrm>
+      </p:grpSpPr>
+      <p:sp>
+        <p:nvSpPr>
+          <p:cNvPr id="2" name="Title 1"/>
+          <p:cNvSpPr>
+            <a:spLocks noGrp="1"/>
+          </p:cNvSpPr>
+          <p:nvPr>
+            <p:ph type="title"/>
+          </p:nvPr>
+        </p:nvSpPr>
+        <p:spPr/>
+        <p:txBody>
+          <a:bodyPr/>
+          <a:lstStyle/>
+          <a:p>
+            <a:r>
+              <a:rPr lang="en-US" dirty="0" smtClean="0"/>
+              <a:t>Question 1.</a:t>
+            </a:r>
+            <a:endParaRPr lang="en-US" dirty="0"/>
+          </a:p>
+        </p:txBody>
+      </p:sp>
+      <p:sp>
+        <p:nvSpPr>
+          <p:cNvPr id="3" name="Content Placeholder 2"/>
+          <p:cNvSpPr>
+            <a:spLocks noGrp="1"/>
+          </p:cNvSpPr>
+          <p:nvPr>
+            <p:ph idx="1"/>
+          </p:nvPr>
+        </p:nvSpPr>
+        <p:spPr/>
+        <p:txBody>
+          <a:bodyPr/>
+          <a:lstStyle/>
+          <a:p>
+            <a:r>
+              <a:rPr lang="en-US" dirty="0"/>
+              <a:t>Here are the R commands to read in the file. [[Switch to a fixed width font like Courier New for R commands and R output.]]</a:t>
+            </a:r>
+          </a:p>
+          <a:p>
+            <a:pPr lvl="1"/>
+            <a:r>
+              <a:rPr lang="en-US" sz="2400" dirty="0">
+                <a:latin typeface="Courier New" panose="02070309020205020404" pitchFamily="49" charset="0"/>
+                <a:cs typeface="Courier New" panose="02070309020205020404" pitchFamily="49" charset="0"/>
+              </a:rPr>
+              <a:t>&gt; </a:t>
+            </a:r>
+            <a:r>
+              <a:rPr lang="en-US" sz="2400" dirty="0" err="1">
+                <a:latin typeface="Courier New" panose="02070309020205020404" pitchFamily="49" charset="0"/>
+                <a:cs typeface="Courier New" panose="02070309020205020404" pitchFamily="49" charset="0"/>
+              </a:rPr>
+              <a:t>fn</a:t>
+            </a:r>
+            <a:r>
+              <a:rPr lang="en-US" sz="2400" dirty="0">
+                <a:latin typeface="Courier New" panose="02070309020205020404" pitchFamily="49" charset="0"/>
+                <a:cs typeface="Courier New" panose="02070309020205020404" pitchFamily="49" charset="0"/>
+              </a:rPr>
+              <a:t> &lt;- "http://www.amstat.org/publications/jse/datasets/fat.dat.txt"</a:t>
+            </a:r>
+          </a:p>
+          <a:p>
+            <a:pPr lvl="1"/>
+            <a:r>
+              <a:rPr lang="en-US" sz="2400" dirty="0">
+                <a:latin typeface="Courier New" panose="02070309020205020404" pitchFamily="49" charset="0"/>
+                <a:cs typeface="Courier New" panose="02070309020205020404" pitchFamily="49" charset="0"/>
+              </a:rPr>
+              <a:t>&gt; </a:t>
+            </a:r>
+            <a:r>
+              <a:rPr lang="en-US" sz="2400" dirty="0" err="1">
+                <a:latin typeface="Courier New" panose="02070309020205020404" pitchFamily="49" charset="0"/>
+                <a:cs typeface="Courier New" panose="02070309020205020404" pitchFamily="49" charset="0"/>
+              </a:rPr>
+              <a:t>fd</a:t>
+            </a:r>
+            <a:r>
+              <a:rPr lang="en-US" sz="2400" dirty="0">
+                <a:latin typeface="Courier New" panose="02070309020205020404" pitchFamily="49" charset="0"/>
+                <a:cs typeface="Courier New" panose="02070309020205020404" pitchFamily="49" charset="0"/>
+              </a:rPr>
+              <a:t> &lt;- </a:t>
+            </a:r>
+            <a:r>
+              <a:rPr lang="en-US" sz="2400" dirty="0" err="1">
+                <a:latin typeface="Courier New" panose="02070309020205020404" pitchFamily="49" charset="0"/>
+                <a:cs typeface="Courier New" panose="02070309020205020404" pitchFamily="49" charset="0"/>
+              </a:rPr>
+              <a:t>read.table</a:t>
+            </a:r>
+            <a:r>
+              <a:rPr lang="en-US" sz="2400" dirty="0">
+                <a:latin typeface="Courier New" panose="02070309020205020404" pitchFamily="49" charset="0"/>
+                <a:cs typeface="Courier New" panose="02070309020205020404" pitchFamily="49" charset="0"/>
+              </a:rPr>
+              <a:t>(file=</a:t>
+            </a:r>
+            <a:r>
+              <a:rPr lang="en-US" sz="2400" dirty="0" err="1">
+                <a:latin typeface="Courier New" panose="02070309020205020404" pitchFamily="49" charset="0"/>
+                <a:cs typeface="Courier New" panose="02070309020205020404" pitchFamily="49" charset="0"/>
+              </a:rPr>
+              <a:t>fn</a:t>
+            </a:r>
+            <a:r>
+              <a:rPr lang="en-US" sz="2400" dirty="0">
+                <a:latin typeface="Courier New" panose="02070309020205020404" pitchFamily="49" charset="0"/>
+                <a:cs typeface="Courier New" panose="02070309020205020404" pitchFamily="49" charset="0"/>
+              </a:rPr>
+              <a:t>)</a:t>
+            </a:r>
+          </a:p>
+          <a:p>
+            <a:endParaRPr lang="en-US" dirty="0"/>
+          </a:p>
+        </p:txBody>
+      </p:sp>
+    </p:spTree>
+    <p:extLst>
+      <p:ext uri="{BB962C8B-B14F-4D97-AF65-F5344CB8AC3E}">
+        <p14:creationId xmlns:p14="http://schemas.microsoft.com/office/powerpoint/2010/main" val="2846466923"/>
+      </p:ext>
+    </p:extLst>
+  </p:cSld>
+  <p:clrMapOvr>
+    <a:masterClrMapping/>
+  </p:clrMapOvr>
+  <p:timing>
+    <p:tnLst>
+      <p:par>
+        <p:cTn id="1" dur="indefinite" restart="never" nodeType="tmRoot"/>
+      </p:par>
+    </p:tnLst>
+  </p:timing>
+</p:sld>
+</file>
+
+<file path=ppt/slides/slide5.xml><?xml version="1.0" encoding="utf-8"?>
+<p:sld xmlns:a="http://schemas.openxmlformats.org/drawingml/2006/main" xmlns:r="http://schemas.openxmlformats.org/officeDocument/2006/relationships" xmlns:p="http://schemas.openxmlformats.org/presentationml/2006/main">
+  <p:cSld>
+    <p:spTree>
+      <p:nvGrpSpPr>
+        <p:cNvPr id="1" name=""/>
+        <p:cNvGrpSpPr/>
+        <p:nvPr/>
+      </p:nvGrpSpPr>
+      <p:grpSpPr>
+        <a:xfrm>
+          <a:off x="0" y="0"/>
+          <a:ext cx="0" cy="0"/>
+          <a:chOff x="0" y="0"/>
+          <a:chExt cx="0" cy="0"/>
+        </a:xfrm>
+      </p:grpSpPr>
+      <p:sp>
+        <p:nvSpPr>
+          <p:cNvPr id="2" name="Title 1"/>
+          <p:cNvSpPr>
+            <a:spLocks noGrp="1"/>
+          </p:cNvSpPr>
+          <p:nvPr>
+            <p:ph type="title"/>
+          </p:nvPr>
+        </p:nvSpPr>
+        <p:spPr/>
+        <p:txBody>
+          <a:bodyPr/>
+          <a:lstStyle/>
+          <a:p>
+            <a:r>
+              <a:rPr lang="en-US" dirty="0" smtClean="0"/>
+              <a:t>Question 1.</a:t>
+            </a:r>
+            <a:endParaRPr lang="en-US" dirty="0"/>
+          </a:p>
+        </p:txBody>
+      </p:sp>
+      <p:sp>
+        <p:nvSpPr>
+          <p:cNvPr id="3" name="Content Placeholder 2"/>
+          <p:cNvSpPr>
+            <a:spLocks noGrp="1"/>
+          </p:cNvSpPr>
+          <p:nvPr>
+            <p:ph idx="1"/>
+          </p:nvPr>
+        </p:nvSpPr>
+        <p:spPr/>
+        <p:txBody>
+          <a:bodyPr>
+            <a:normAutofit fontScale="40000" lnSpcReduction="20000"/>
+          </a:bodyPr>
+          <a:lstStyle/>
+          <a:p>
+            <a:r>
+              <a:rPr lang="en-US" sz="8000" dirty="0"/>
+              <a:t>Here are the first few rows of the data set.</a:t>
+            </a:r>
+          </a:p>
+          <a:p>
+            <a:r>
+              <a:rPr lang="en-US" sz="3500" dirty="0">
+                <a:latin typeface="Courier New" panose="02070309020205020404" pitchFamily="49" charset="0"/>
+                <a:cs typeface="Courier New" panose="02070309020205020404" pitchFamily="49" charset="0"/>
+              </a:rPr>
+              <a:t>&gt; head(</a:t>
+            </a:r>
+            <a:r>
+              <a:rPr lang="en-US" sz="3500" dirty="0" err="1">
+                <a:latin typeface="Courier New" panose="02070309020205020404" pitchFamily="49" charset="0"/>
+                <a:cs typeface="Courier New" panose="02070309020205020404" pitchFamily="49" charset="0"/>
+              </a:rPr>
+              <a:t>fd</a:t>
+            </a:r>
+            <a:r>
+              <a:rPr lang="en-US" sz="3500" dirty="0">
+                <a:latin typeface="Courier New" panose="02070309020205020404" pitchFamily="49" charset="0"/>
+                <a:cs typeface="Courier New" panose="02070309020205020404" pitchFamily="49" charset="0"/>
+              </a:rPr>
+              <a:t>)</a:t>
+            </a:r>
+          </a:p>
+          <a:p>
+            <a:r>
+              <a:rPr lang="en-US" sz="3500" dirty="0">
+                <a:latin typeface="Courier New" panose="02070309020205020404" pitchFamily="49" charset="0"/>
+                <a:cs typeface="Courier New" panose="02070309020205020404" pitchFamily="49" charset="0"/>
+              </a:rPr>
+              <a:t>  V1   V2   V3     V4 V5     V6    V7   V8    V9  V10   V11   V12   V13</a:t>
+            </a:r>
+          </a:p>
+          <a:p>
+            <a:r>
+              <a:rPr lang="en-US" sz="3500" dirty="0">
+                <a:latin typeface="Courier New" panose="02070309020205020404" pitchFamily="49" charset="0"/>
+                <a:cs typeface="Courier New" panose="02070309020205020404" pitchFamily="49" charset="0"/>
+              </a:rPr>
+              <a:t>1  1 12.6 12.3 1.0708 23 154.25 67.75 23.7 134.9 36.2  93.1  85.2  94.5</a:t>
+            </a:r>
+          </a:p>
+          <a:p>
+            <a:r>
+              <a:rPr lang="en-US" sz="3500" dirty="0">
+                <a:latin typeface="Courier New" panose="02070309020205020404" pitchFamily="49" charset="0"/>
+                <a:cs typeface="Courier New" panose="02070309020205020404" pitchFamily="49" charset="0"/>
+              </a:rPr>
+              <a:t>2  2  6.9  6.1 1.0853 22 173.25 72.25 23.4 161.3 38.5  93.6  83.0  98.7</a:t>
+            </a:r>
+          </a:p>
+          <a:p>
+            <a:r>
+              <a:rPr lang="en-US" sz="3500" dirty="0">
+                <a:latin typeface="Courier New" panose="02070309020205020404" pitchFamily="49" charset="0"/>
+                <a:cs typeface="Courier New" panose="02070309020205020404" pitchFamily="49" charset="0"/>
+              </a:rPr>
+              <a:t>3  3 24.6 25.3 1.0414 22 154.00 66.25 24.7 116.0 34.0  95.8  87.9  99.2</a:t>
+            </a:r>
+          </a:p>
+          <a:p>
+            <a:r>
+              <a:rPr lang="en-US" sz="3500" dirty="0">
+                <a:latin typeface="Courier New" panose="02070309020205020404" pitchFamily="49" charset="0"/>
+                <a:cs typeface="Courier New" panose="02070309020205020404" pitchFamily="49" charset="0"/>
+              </a:rPr>
+              <a:t>4  4 10.9 10.4 1.0751 26 184.75 72.25 24.9 164.7 37.4 101.8  86.4 101.2</a:t>
+            </a:r>
+          </a:p>
+          <a:p>
+            <a:r>
+              <a:rPr lang="en-US" sz="3500" dirty="0">
+                <a:latin typeface="Courier New" panose="02070309020205020404" pitchFamily="49" charset="0"/>
+                <a:cs typeface="Courier New" panose="02070309020205020404" pitchFamily="49" charset="0"/>
+              </a:rPr>
+              <a:t>5  5 27.8 28.7 1.0340 24 184.25 71.25 25.6 133.1 34.4  97.3 100.0 101.9</a:t>
+            </a:r>
+          </a:p>
+          <a:p>
+            <a:r>
+              <a:rPr lang="en-US" sz="3500" dirty="0">
+                <a:latin typeface="Courier New" panose="02070309020205020404" pitchFamily="49" charset="0"/>
+                <a:cs typeface="Courier New" panose="02070309020205020404" pitchFamily="49" charset="0"/>
+              </a:rPr>
+              <a:t>6  6 20.6 20.9 1.0502 24 210.25 74.75 26.5 167.0 39.0 104.5  94.4 107.8</a:t>
+            </a:r>
+          </a:p>
+          <a:p>
+            <a:r>
+              <a:rPr lang="en-US" sz="3500" dirty="0">
+                <a:latin typeface="Courier New" panose="02070309020205020404" pitchFamily="49" charset="0"/>
+                <a:cs typeface="Courier New" panose="02070309020205020404" pitchFamily="49" charset="0"/>
+              </a:rPr>
+              <a:t>   V14  V15  V16  V17  V18  V19</a:t>
+            </a:r>
+          </a:p>
+          <a:p>
+            <a:r>
+              <a:rPr lang="en-US" sz="3500" dirty="0">
+                <a:latin typeface="Courier New" panose="02070309020205020404" pitchFamily="49" charset="0"/>
+                <a:cs typeface="Courier New" panose="02070309020205020404" pitchFamily="49" charset="0"/>
+              </a:rPr>
+              <a:t>1 59.0 37.3 21.9 32.0 27.4 17.1</a:t>
+            </a:r>
+          </a:p>
+          <a:p>
+            <a:r>
+              <a:rPr lang="en-US" sz="3500" dirty="0">
+                <a:latin typeface="Courier New" panose="02070309020205020404" pitchFamily="49" charset="0"/>
+                <a:cs typeface="Courier New" panose="02070309020205020404" pitchFamily="49" charset="0"/>
+              </a:rPr>
+              <a:t>2 58.7 37.3 23.4 30.5 28.9 18.2</a:t>
+            </a:r>
+          </a:p>
+          <a:p>
+            <a:r>
+              <a:rPr lang="en-US" sz="3500" dirty="0">
+                <a:latin typeface="Courier New" panose="02070309020205020404" pitchFamily="49" charset="0"/>
+                <a:cs typeface="Courier New" panose="02070309020205020404" pitchFamily="49" charset="0"/>
+              </a:rPr>
+              <a:t>3 59.6 38.9 24.0 28.8 25.2 16.6</a:t>
+            </a:r>
+          </a:p>
+          <a:p>
+            <a:r>
+              <a:rPr lang="en-US" sz="3500" dirty="0">
+                <a:latin typeface="Courier New" panose="02070309020205020404" pitchFamily="49" charset="0"/>
+                <a:cs typeface="Courier New" panose="02070309020205020404" pitchFamily="49" charset="0"/>
+              </a:rPr>
+              <a:t>4 60.1 37.3 22.8 32.4 29.4 18.2</a:t>
+            </a:r>
+          </a:p>
+          <a:p>
+            <a:r>
+              <a:rPr lang="en-US" sz="3500" dirty="0">
+                <a:latin typeface="Courier New" panose="02070309020205020404" pitchFamily="49" charset="0"/>
+                <a:cs typeface="Courier New" panose="02070309020205020404" pitchFamily="49" charset="0"/>
+              </a:rPr>
+              <a:t>5 63.2 42.2 24.0 32.2 27.7 17.7</a:t>
+            </a:r>
+          </a:p>
+          <a:p>
+            <a:r>
+              <a:rPr lang="en-US" sz="3500" dirty="0">
+                <a:latin typeface="Courier New" panose="02070309020205020404" pitchFamily="49" charset="0"/>
+                <a:cs typeface="Courier New" panose="02070309020205020404" pitchFamily="49" charset="0"/>
+              </a:rPr>
+              <a:t>6 66.0 42.0 25.6 35.7 30.6 18.8</a:t>
+            </a:r>
+          </a:p>
+          <a:p>
+            <a:endParaRPr lang="en-US" dirty="0"/>
+          </a:p>
+        </p:txBody>
+      </p:sp>
+    </p:spTree>
+    <p:extLst>
+      <p:ext uri="{BB962C8B-B14F-4D97-AF65-F5344CB8AC3E}">
+        <p14:creationId xmlns:p14="http://schemas.microsoft.com/office/powerpoint/2010/main" val="2587487952"/>
+      </p:ext>
+    </p:extLst>
+  </p:cSld>
+  <p:clrMapOvr>
+    <a:masterClrMapping/>
+  </p:clrMapOvr>
+  <p:timing>
+    <p:tnLst>
+      <p:par>
+        <p:cTn id="1" dur="indefinite" restart="never" nodeType="tmRoot"/>
+      </p:par>
+    </p:tnLst>
+  </p:timing>
+</p:sld>
+</file>
+
+<file path=ppt/slides/slide6.xml><?xml version="1.0" encoding="utf-8"?>
+<p:sld xmlns:a="http://schemas.openxmlformats.org/drawingml/2006/main" xmlns:r="http://schemas.openxmlformats.org/officeDocument/2006/relationships" xmlns:p="http://schemas.openxmlformats.org/presentationml/2006/main">
+  <p:cSld>
+    <p:spTree>
+      <p:nvGrpSpPr>
+        <p:cNvPr id="1" name=""/>
+        <p:cNvGrpSpPr/>
+        <p:nvPr/>
+      </p:nvGrpSpPr>
+      <p:grpSpPr>
+        <a:xfrm>
+          <a:off x="0" y="0"/>
+          <a:ext cx="0" cy="0"/>
+          <a:chOff x="0" y="0"/>
+          <a:chExt cx="0" cy="0"/>
+        </a:xfrm>
+      </p:grpSpPr>
+      <p:sp>
+        <p:nvSpPr>
+          <p:cNvPr id="2" name="Title 1"/>
+          <p:cNvSpPr>
+            <a:spLocks noGrp="1"/>
+          </p:cNvSpPr>
+          <p:nvPr>
+            <p:ph type="title"/>
+          </p:nvPr>
+        </p:nvSpPr>
+        <p:spPr/>
+        <p:txBody>
+          <a:bodyPr/>
+          <a:lstStyle/>
+          <a:p>
+            <a:r>
+              <a:rPr lang="en-US" dirty="0" smtClean="0"/>
+              <a:t>Question 1.</a:t>
+            </a:r>
+            <a:endParaRPr lang="en-US" dirty="0"/>
+          </a:p>
+        </p:txBody>
+      </p:sp>
+      <p:sp>
+        <p:nvSpPr>
+          <p:cNvPr id="3" name="Content Placeholder 2"/>
+          <p:cNvSpPr>
+            <a:spLocks noGrp="1"/>
+          </p:cNvSpPr>
+          <p:nvPr>
+            <p:ph idx="1"/>
+          </p:nvPr>
+        </p:nvSpPr>
+        <p:spPr/>
+        <p:txBody>
+          <a:bodyPr>
+            <a:normAutofit fontScale="40000" lnSpcReduction="20000"/>
+          </a:bodyPr>
+          <a:lstStyle/>
+          <a:p>
+            <a:r>
+              <a:rPr lang="en-US" sz="8000" dirty="0"/>
+              <a:t>Here are the last few rows of the data set.</a:t>
+            </a:r>
+          </a:p>
+          <a:p>
+            <a:r>
+              <a:rPr lang="en-US" dirty="0">
+                <a:latin typeface="Courier New" panose="02070309020205020404" pitchFamily="49" charset="0"/>
+                <a:cs typeface="Courier New" panose="02070309020205020404" pitchFamily="49" charset="0"/>
+              </a:rPr>
+              <a:t>&gt; tail(</a:t>
+            </a:r>
+            <a:r>
+              <a:rPr lang="en-US" dirty="0" err="1">
+                <a:latin typeface="Courier New" panose="02070309020205020404" pitchFamily="49" charset="0"/>
+                <a:cs typeface="Courier New" panose="02070309020205020404" pitchFamily="49" charset="0"/>
+              </a:rPr>
+              <a:t>fd</a:t>
+            </a:r>
+            <a:r>
+              <a:rPr lang="en-US" dirty="0">
+                <a:latin typeface="Courier New" panose="02070309020205020404" pitchFamily="49" charset="0"/>
+                <a:cs typeface="Courier New" panose="02070309020205020404" pitchFamily="49" charset="0"/>
+              </a:rPr>
+              <a:t>)</a:t>
+            </a:r>
+          </a:p>
+          <a:p>
+            <a:r>
+              <a:rPr lang="en-US" dirty="0" smtClean="0">
+                <a:latin typeface="Courier New" panose="02070309020205020404" pitchFamily="49" charset="0"/>
+                <a:cs typeface="Courier New" panose="02070309020205020404" pitchFamily="49" charset="0"/>
+              </a:rPr>
+              <a:t>     </a:t>
+            </a:r>
+            <a:r>
+              <a:rPr lang="en-US" dirty="0">
+                <a:latin typeface="Courier New" panose="02070309020205020404" pitchFamily="49" charset="0"/>
+                <a:cs typeface="Courier New" panose="02070309020205020404" pitchFamily="49" charset="0"/>
+              </a:rPr>
+              <a:t>V1   V2   V3     V4 V5     V6    V7   V8    V9  V10   V11   V12   V13</a:t>
+            </a:r>
+          </a:p>
+          <a:p>
+            <a:r>
+              <a:rPr lang="en-US" dirty="0">
+                <a:latin typeface="Courier New" panose="02070309020205020404" pitchFamily="49" charset="0"/>
+                <a:cs typeface="Courier New" panose="02070309020205020404" pitchFamily="49" charset="0"/>
+              </a:rPr>
+              <a:t>247 247 29.1 30.2 1.0308 69 215.50 70.50 30.5 152.7 40.8 113.7 107.6 110.0</a:t>
+            </a:r>
+          </a:p>
+          <a:p>
+            <a:r>
+              <a:rPr lang="en-US" dirty="0">
+                <a:latin typeface="Courier New" panose="02070309020205020404" pitchFamily="49" charset="0"/>
+                <a:cs typeface="Courier New" panose="02070309020205020404" pitchFamily="49" charset="0"/>
+              </a:rPr>
+              <a:t>248 248 11.5 11.0 1.0736 70 134.25 67.00 21.1 118.9 34.9  89.2  83.6  88.8</a:t>
+            </a:r>
+          </a:p>
+          <a:p>
+            <a:r>
+              <a:rPr lang="en-US" dirty="0">
+                <a:latin typeface="Courier New" panose="02070309020205020404" pitchFamily="49" charset="0"/>
+                <a:cs typeface="Courier New" panose="02070309020205020404" pitchFamily="49" charset="0"/>
+              </a:rPr>
+              <a:t>249 249 32.3 33.6 1.0236 72 201.00 69.75 29.1 136.1 40.9 108.5 105.0 104.5</a:t>
+            </a:r>
+          </a:p>
+          <a:p>
+            <a:r>
+              <a:rPr lang="en-US" dirty="0">
+                <a:latin typeface="Courier New" panose="02070309020205020404" pitchFamily="49" charset="0"/>
+                <a:cs typeface="Courier New" panose="02070309020205020404" pitchFamily="49" charset="0"/>
+              </a:rPr>
+              <a:t>250 250 28.3 29.3 1.0328 72 186.75 66.00 30.2 133.9 38.9 111.1 111.5 101.7</a:t>
+            </a:r>
+          </a:p>
+          <a:p>
+            <a:r>
+              <a:rPr lang="en-US" dirty="0">
+                <a:latin typeface="Courier New" panose="02070309020205020404" pitchFamily="49" charset="0"/>
+                <a:cs typeface="Courier New" panose="02070309020205020404" pitchFamily="49" charset="0"/>
+              </a:rPr>
+              <a:t>251 251 25.3 26.0 1.0399 72 190.75 70.50 27.0 142.6 38.9 108.3 101.3  97.8</a:t>
+            </a:r>
+          </a:p>
+          <a:p>
+            <a:r>
+              <a:rPr lang="en-US" dirty="0">
+                <a:latin typeface="Courier New" panose="02070309020205020404" pitchFamily="49" charset="0"/>
+                <a:cs typeface="Courier New" panose="02070309020205020404" pitchFamily="49" charset="0"/>
+              </a:rPr>
+              <a:t>252 252 30.7 31.9 1.0271 74 207.50 70.00 29.8 143.7 40.8 112.4 108.5 107.1</a:t>
+            </a:r>
+          </a:p>
+          <a:p>
+            <a:r>
+              <a:rPr lang="en-US" dirty="0">
+                <a:latin typeface="Courier New" panose="02070309020205020404" pitchFamily="49" charset="0"/>
+                <a:cs typeface="Courier New" panose="02070309020205020404" pitchFamily="49" charset="0"/>
+              </a:rPr>
+              <a:t>     V14  V15  V16  V17  V18  V19</a:t>
+            </a:r>
+          </a:p>
+          <a:p>
+            <a:r>
+              <a:rPr lang="en-US" dirty="0">
+                <a:latin typeface="Courier New" panose="02070309020205020404" pitchFamily="49" charset="0"/>
+                <a:cs typeface="Courier New" panose="02070309020205020404" pitchFamily="49" charset="0"/>
+              </a:rPr>
+              <a:t>247 63.3 44.0 22.6 37.5 32.6 18.8</a:t>
+            </a:r>
+          </a:p>
+          <a:p>
+            <a:r>
+              <a:rPr lang="en-US" dirty="0">
+                <a:latin typeface="Courier New" panose="02070309020205020404" pitchFamily="49" charset="0"/>
+                <a:cs typeface="Courier New" panose="02070309020205020404" pitchFamily="49" charset="0"/>
+              </a:rPr>
+              <a:t>248 49.6 34.8 21.5 25.6 25.7 18.5</a:t>
+            </a:r>
+          </a:p>
+          <a:p>
+            <a:r>
+              <a:rPr lang="en-US" dirty="0">
+                <a:latin typeface="Courier New" panose="02070309020205020404" pitchFamily="49" charset="0"/>
+                <a:cs typeface="Courier New" panose="02070309020205020404" pitchFamily="49" charset="0"/>
+              </a:rPr>
+              <a:t>249 59.6 40.8 23.2 35.2 28.6 20.1</a:t>
+            </a:r>
+          </a:p>
+          <a:p>
+            <a:r>
+              <a:rPr lang="en-US" dirty="0">
+                <a:latin typeface="Courier New" panose="02070309020205020404" pitchFamily="49" charset="0"/>
+                <a:cs typeface="Courier New" panose="02070309020205020404" pitchFamily="49" charset="0"/>
+              </a:rPr>
+              <a:t>250 60.3 37.3 21.5 31.3 27.2 18.0</a:t>
+            </a:r>
+          </a:p>
+          <a:p>
+            <a:r>
+              <a:rPr lang="en-US" dirty="0">
+                <a:latin typeface="Courier New" panose="02070309020205020404" pitchFamily="49" charset="0"/>
+                <a:cs typeface="Courier New" panose="02070309020205020404" pitchFamily="49" charset="0"/>
+              </a:rPr>
+              <a:t>251 56.0 41.6 22.7 30.5 29.4 19.8</a:t>
+            </a:r>
+          </a:p>
+          <a:p>
+            <a:r>
+              <a:rPr lang="en-US" dirty="0">
+                <a:latin typeface="Courier New" panose="02070309020205020404" pitchFamily="49" charset="0"/>
+                <a:cs typeface="Courier New" panose="02070309020205020404" pitchFamily="49" charset="0"/>
+              </a:rPr>
+              <a:t>252 59.3 42.2 24.6 33.7 30.0 20.9</a:t>
+            </a:r>
+          </a:p>
+          <a:p>
+            <a:endParaRPr lang="en-US" dirty="0"/>
+          </a:p>
+        </p:txBody>
+      </p:sp>
+    </p:spTree>
+    <p:extLst>
+      <p:ext uri="{BB962C8B-B14F-4D97-AF65-F5344CB8AC3E}">
+        <p14:creationId xmlns:p14="http://schemas.microsoft.com/office/powerpoint/2010/main" val="2045493957"/>
+      </p:ext>
+    </p:extLst>
+  </p:cSld>
+  <p:clrMapOvr>
+    <a:masterClrMapping/>
+  </p:clrMapOvr>
+  <p:timing>
+    <p:tnLst>
+      <p:par>
+        <p:cTn id="1" dur="indefinite" restart="never" nodeType="tmRoot"/>
+      </p:par>
+    </p:tnLst>
+  </p:timing>
+</p:sld>
+</file>
+
+<file path=ppt/slides/slide7.xml><?xml version="1.0" encoding="utf-8"?>
+<p:sld xmlns:a="http://schemas.openxmlformats.org/drawingml/2006/main" xmlns:r="http://schemas.openxmlformats.org/officeDocument/2006/relationships" xmlns:p="http://schemas.openxmlformats.org/presentationml/2006/main">
+  <p:cSld>
+    <p:spTree>
+      <p:nvGrpSpPr>
+        <p:cNvPr id="1" name=""/>
+        <p:cNvGrpSpPr/>
+        <p:nvPr/>
+      </p:nvGrpSpPr>
+      <p:grpSpPr>
+        <a:xfrm>
+          <a:off x="0" y="0"/>
+          <a:ext cx="0" cy="0"/>
+          <a:chOff x="0" y="0"/>
+          <a:chExt cx="0" cy="0"/>
+        </a:xfrm>
+      </p:grpSpPr>
+      <p:sp>
+        <p:nvSpPr>
+          <p:cNvPr id="2" name="Title 1"/>
+          <p:cNvSpPr>
+            <a:spLocks noGrp="1"/>
+          </p:cNvSpPr>
+          <p:nvPr>
+            <p:ph type="title"/>
+          </p:nvPr>
+        </p:nvSpPr>
+        <p:spPr/>
+        <p:txBody>
+          <a:bodyPr/>
+          <a:lstStyle/>
+          <a:p>
+            <a:r>
+              <a:rPr lang="en-US" dirty="0" smtClean="0"/>
+              <a:t>Question 2.</a:t>
+            </a:r>
+            <a:endParaRPr lang="en-US" dirty="0"/>
+          </a:p>
+        </p:txBody>
+      </p:sp>
+      <p:sp>
+        <p:nvSpPr>
+          <p:cNvPr id="3" name="Content Placeholder 2"/>
+          <p:cNvSpPr>
+            <a:spLocks noGrp="1"/>
+          </p:cNvSpPr>
+          <p:nvPr>
+            <p:ph idx="1"/>
+          </p:nvPr>
+        </p:nvSpPr>
+        <p:spPr/>
+        <p:txBody>
+          <a:bodyPr>
+            <a:normAutofit fontScale="25000" lnSpcReduction="20000"/>
+          </a:bodyPr>
+          <a:lstStyle/>
+          <a:p>
+            <a:r>
+              <a:rPr lang="en-US" sz="12800" dirty="0"/>
+              <a:t>Here are all the </a:t>
+            </a:r>
+            <a:r>
+              <a:rPr lang="en-US" sz="12800" dirty="0" err="1"/>
+              <a:t>bmi</a:t>
+            </a:r>
+            <a:r>
+              <a:rPr lang="en-US" sz="12800" dirty="0"/>
+              <a:t> values.</a:t>
+            </a:r>
+          </a:p>
+          <a:p>
+            <a:r>
+              <a:rPr lang="en-US" sz="4800" dirty="0">
+                <a:latin typeface="Courier New" panose="02070309020205020404" pitchFamily="49" charset="0"/>
+                <a:cs typeface="Courier New" panose="02070309020205020404" pitchFamily="49" charset="0"/>
+              </a:rPr>
+              <a:t>&gt; names(</a:t>
+            </a:r>
+            <a:r>
+              <a:rPr lang="en-US" sz="4800" dirty="0" err="1">
+                <a:latin typeface="Courier New" panose="02070309020205020404" pitchFamily="49" charset="0"/>
+                <a:cs typeface="Courier New" panose="02070309020205020404" pitchFamily="49" charset="0"/>
+              </a:rPr>
+              <a:t>fd</a:t>
+            </a:r>
+            <a:r>
+              <a:rPr lang="en-US" sz="4800" dirty="0">
+                <a:latin typeface="Courier New" panose="02070309020205020404" pitchFamily="49" charset="0"/>
+                <a:cs typeface="Courier New" panose="02070309020205020404" pitchFamily="49" charset="0"/>
+              </a:rPr>
+              <a:t>) &lt;- c("case","fat.b","fat.s","dens","age","wt","ht","bmi","ffw","neck","chest","abdomen","hip","thigh","knee","ankle","biceps","forearm","wrist")</a:t>
+            </a:r>
+          </a:p>
+          <a:p>
+            <a:r>
+              <a:rPr lang="en-US" sz="4800" dirty="0">
+                <a:latin typeface="Courier New" panose="02070309020205020404" pitchFamily="49" charset="0"/>
+                <a:cs typeface="Courier New" panose="02070309020205020404" pitchFamily="49" charset="0"/>
+              </a:rPr>
+              <a:t>&gt; </a:t>
+            </a:r>
+            <a:r>
+              <a:rPr lang="en-US" sz="4800" dirty="0" err="1">
+                <a:latin typeface="Courier New" panose="02070309020205020404" pitchFamily="49" charset="0"/>
+                <a:cs typeface="Courier New" panose="02070309020205020404" pitchFamily="49" charset="0"/>
+              </a:rPr>
+              <a:t>fd$bmi</a:t>
+            </a:r>
+            <a:endParaRPr lang="en-US" sz="4800" dirty="0">
+              <a:latin typeface="Courier New" panose="02070309020205020404" pitchFamily="49" charset="0"/>
+              <a:cs typeface="Courier New" panose="02070309020205020404" pitchFamily="49" charset="0"/>
+            </a:endParaRPr>
+          </a:p>
+          <a:p>
+            <a:r>
+              <a:rPr lang="en-US" sz="4800" dirty="0">
+                <a:latin typeface="Courier New" panose="02070309020205020404" pitchFamily="49" charset="0"/>
+                <a:cs typeface="Courier New" panose="02070309020205020404" pitchFamily="49" charset="0"/>
+              </a:rPr>
+              <a:t>  [1] 23.7 23.4 24.7 24.9 25.6 26.5 26.2 23.6 24.6 25.8 23.6 26.3 26.3 28.5</a:t>
+            </a:r>
+          </a:p>
+          <a:p>
+            <a:r>
+              <a:rPr lang="en-US" sz="4800" dirty="0">
+                <a:latin typeface="Courier New" panose="02070309020205020404" pitchFamily="49" charset="0"/>
+                <a:cs typeface="Courier New" panose="02070309020205020404" pitchFamily="49" charset="0"/>
+              </a:rPr>
+              <a:t> [15] 27.4 26.3 27.3 29.2 28.2 27.6 27.3 29.1 21.2 21.4 23.2 21.9 20.3 22.9</a:t>
+            </a:r>
+          </a:p>
+          <a:p>
+            <a:r>
+              <a:rPr lang="en-US" sz="4800" dirty="0">
+                <a:latin typeface="Courier New" panose="02070309020205020404" pitchFamily="49" charset="0"/>
+                <a:cs typeface="Courier New" panose="02070309020205020404" pitchFamily="49" charset="0"/>
+              </a:rPr>
+              <a:t> [29] 22.4 23.8 23.6 22.2 23.3 30.5 32.2 32.0 29.1 29.7 48.9 31.8 39.1 29.9</a:t>
+            </a:r>
+          </a:p>
+          <a:p>
+            <a:r>
+              <a:rPr lang="en-US" sz="4800" dirty="0">
+                <a:latin typeface="Courier New" panose="02070309020205020404" pitchFamily="49" charset="0"/>
+                <a:cs typeface="Courier New" panose="02070309020205020404" pitchFamily="49" charset="0"/>
+              </a:rPr>
+              <a:t> [43] 31.2 29.2 19.1 21.3 20.6 20.6 20.4 20.2 21.3 20.6 21.1 19.9 21.1 26.9</a:t>
+            </a:r>
+          </a:p>
+          <a:p>
+            <a:r>
+              <a:rPr lang="en-US" sz="4800" dirty="0">
+                <a:latin typeface="Courier New" panose="02070309020205020404" pitchFamily="49" charset="0"/>
+                <a:cs typeface="Courier New" panose="02070309020205020404" pitchFamily="49" charset="0"/>
+              </a:rPr>
+              <a:t> [57] 27.6 29.3 28.4 29.2 28.2 26.8 27.6 27.9 29.5 28.3 21.3 21.3 22.8 21.6</a:t>
+            </a:r>
+          </a:p>
+          <a:p>
+            <a:r>
+              <a:rPr lang="en-US" sz="4800" dirty="0">
+                <a:latin typeface="Courier New" panose="02070309020205020404" pitchFamily="49" charset="0"/>
+                <a:cs typeface="Courier New" panose="02070309020205020404" pitchFamily="49" charset="0"/>
+              </a:rPr>
+              <a:t> [71] 23.1 21.9 20.8 21.5 23.3 22.9 23.7 26.7 23.0 25.1 25.1 23.4 25.3 24.5</a:t>
+            </a:r>
+          </a:p>
+          <a:p>
+            <a:r>
+              <a:rPr lang="en-US" sz="4800" dirty="0">
+                <a:latin typeface="Courier New" panose="02070309020205020404" pitchFamily="49" charset="0"/>
+                <a:cs typeface="Courier New" panose="02070309020205020404" pitchFamily="49" charset="0"/>
+              </a:rPr>
+              <a:t> [85] 24.7 26.0 24.6 26.0 23.7 23.3 25.4 26.2 23.4 26.3 23.4 26.1 24.8 25.9</a:t>
+            </a:r>
+          </a:p>
+          <a:p>
+            <a:r>
+              <a:rPr lang="en-US" sz="4800" dirty="0">
+                <a:latin typeface="Courier New" panose="02070309020205020404" pitchFamily="49" charset="0"/>
+                <a:cs typeface="Courier New" panose="02070309020205020404" pitchFamily="49" charset="0"/>
+              </a:rPr>
+              <a:t> [99] 23.7 26.7 25.9 23.6 24.0 25.5 26.0 24.8 26.0 26.0 24.0 24.7 25.6 26.3</a:t>
+            </a:r>
+          </a:p>
+          <a:p>
+            <a:r>
+              <a:rPr lang="en-US" sz="4800" dirty="0">
+                <a:latin typeface="Courier New" panose="02070309020205020404" pitchFamily="49" charset="0"/>
+                <a:cs typeface="Courier New" panose="02070309020205020404" pitchFamily="49" charset="0"/>
+              </a:rPr>
+              <a:t>[113] 25.6 23.3 24.0 23.4 23.6 24.3 24.6 25.3 26.2 25.5 23.9 23.9 25.6 26.2</a:t>
+            </a:r>
+          </a:p>
+          <a:p>
+            <a:r>
+              <a:rPr lang="en-US" sz="4800" dirty="0">
+                <a:latin typeface="Courier New" panose="02070309020205020404" pitchFamily="49" charset="0"/>
+                <a:cs typeface="Courier New" panose="02070309020205020404" pitchFamily="49" charset="0"/>
+              </a:rPr>
+              <a:t>[127] 26.4 23.4 25.2 23.9 23.7 24.3 25.8 24.8 24.5 26.8 23.5 24.1 23.3 26.6</a:t>
+            </a:r>
+          </a:p>
+          <a:p>
+            <a:r>
+              <a:rPr lang="en-US" sz="4800" dirty="0">
+                <a:latin typeface="Courier New" panose="02070309020205020404" pitchFamily="49" charset="0"/>
+                <a:cs typeface="Courier New" panose="02070309020205020404" pitchFamily="49" charset="0"/>
+              </a:rPr>
+              <a:t>[141] 24.6 25.3 25.6 21.6 22.1 21.9 27.7 29.8 19.3 31.8 22.5 30.7 19.7 24.4</a:t>
+            </a:r>
+          </a:p>
+          <a:p>
+            <a:r>
+              <a:rPr lang="en-US" sz="4800" dirty="0">
+                <a:latin typeface="Courier New" panose="02070309020205020404" pitchFamily="49" charset="0"/>
+                <a:cs typeface="Courier New" panose="02070309020205020404" pitchFamily="49" charset="0"/>
+              </a:rPr>
+              <a:t>[155] 26.1 21.6 30.4 24.6 20.3 24.4 20.4 25.9 24.4 19.8 29.7 28.1 25.3 30.3</a:t>
+            </a:r>
+          </a:p>
+          <a:p>
+            <a:r>
+              <a:rPr lang="en-US" sz="4800" dirty="0">
+                <a:latin typeface="Courier New" panose="02070309020205020404" pitchFamily="49" charset="0"/>
+                <a:cs typeface="Courier New" panose="02070309020205020404" pitchFamily="49" charset="0"/>
+              </a:rPr>
+              <a:t>[169] 33.3 25.2 23.4 20.6 24.8 24.3 31.0 21.3 23.7 33.2 27.5 29.8 28.0 18.1</a:t>
+            </a:r>
+          </a:p>
+          <a:p>
+            <a:r>
+              <a:rPr lang="en-US" sz="4800" dirty="0">
+                <a:latin typeface="Courier New" panose="02070309020205020404" pitchFamily="49" charset="0"/>
+                <a:cs typeface="Courier New" panose="02070309020205020404" pitchFamily="49" charset="0"/>
+              </a:rPr>
+              <a:t>[183] 22.7 23.0 21.8 23.1 29.7 28.6 27.0 28.0 22.5 29.8 27.4 28.3 21.6 27.2</a:t>
+            </a:r>
+          </a:p>
+          <a:p>
+            <a:r>
+              <a:rPr lang="en-US" sz="4800" dirty="0">
+                <a:latin typeface="Courier New" panose="02070309020205020404" pitchFamily="49" charset="0"/>
+                <a:cs typeface="Courier New" panose="02070309020205020404" pitchFamily="49" charset="0"/>
+              </a:rPr>
+              <a:t>[197] 23.1 23.1 22.3 26.4 25.4 22.0 27.6 23.7 32.3 27.6 27.2 26.1 22.9 22.5</a:t>
+            </a:r>
+          </a:p>
+          <a:p>
+            <a:r>
+              <a:rPr lang="en-US" sz="4800" dirty="0">
+                <a:latin typeface="Courier New" panose="02070309020205020404" pitchFamily="49" charset="0"/>
+                <a:cs typeface="Courier New" panose="02070309020205020404" pitchFamily="49" charset="0"/>
+              </a:rPr>
+              <a:t>[211] 21.4 27.4 23.0 27.4 22.8 37.6 21.6 22.2 27.2 22.7 24.5 31.0 25.0 22.2</a:t>
+            </a:r>
+          </a:p>
+          <a:p>
+            <a:r>
+              <a:rPr lang="en-US" sz="4800" dirty="0">
+                <a:latin typeface="Courier New" panose="02070309020205020404" pitchFamily="49" charset="0"/>
+                <a:cs typeface="Courier New" panose="02070309020205020404" pitchFamily="49" charset="0"/>
+              </a:rPr>
+              <a:t>[225] 26.8 20.0 25.6 25.3 25.4 25.2 24.1 24.9 24.2 25.2 24.1 26.1 25.8 31.9</a:t>
+            </a:r>
+          </a:p>
+          <a:p>
+            <a:r>
+              <a:rPr lang="en-US" sz="4800" dirty="0">
+                <a:latin typeface="Courier New" panose="02070309020205020404" pitchFamily="49" charset="0"/>
+                <a:cs typeface="Courier New" panose="02070309020205020404" pitchFamily="49" charset="0"/>
+              </a:rPr>
+              <a:t>[239] 22.6 30.9 20.8 33.9 31.8 30.3 29.9 22.8 30.5 21.1 29.1 30.2 27.0 29.8</a:t>
+            </a:r>
+          </a:p>
+          <a:p>
+            <a:endParaRPr lang="en-US" sz="4800" dirty="0">
+              <a:latin typeface="Courier New" panose="02070309020205020404" pitchFamily="49" charset="0"/>
+              <a:cs typeface="Courier New" panose="02070309020205020404" pitchFamily="49" charset="0"/>
+            </a:endParaRPr>
+          </a:p>
+        </p:txBody>
+      </p:sp>
+    </p:spTree>
+    <p:extLst>
+      <p:ext uri="{BB962C8B-B14F-4D97-AF65-F5344CB8AC3E}">
+        <p14:creationId xmlns:p14="http://schemas.microsoft.com/office/powerpoint/2010/main" val="2927617128"/>
+      </p:ext>
+    </p:extLst>
+  </p:cSld>
+  <p:clrMapOvr>
+    <a:masterClrMapping/>
+  </p:clrMapOvr>
+  <p:timing>
+    <p:tnLst>
+      <p:par>
+        <p:cTn id="1" dur="indefinite" restart="never" nodeType="tmRoot"/>
+      </p:par>
+    </p:tnLst>
+  </p:timing>
+</p:sld>
+</file>
+
+<file path=ppt/slides/slide8.xml><?xml version="1.0" encoding="utf-8"?>
+<p:sld xmlns:a="http://schemas.openxmlformats.org/drawingml/2006/main" xmlns:r="http://schemas.openxmlformats.org/officeDocument/2006/relationships" xmlns:p="http://schemas.openxmlformats.org/presentationml/2006/main">
+  <p:cSld>
+    <p:spTree>
+      <p:nvGrpSpPr>
+        <p:cNvPr id="1" name=""/>
+        <p:cNvGrpSpPr/>
+        <p:nvPr/>
+      </p:nvGrpSpPr>
+      <p:grpSpPr>
+        <a:xfrm>
+          <a:off x="0" y="0"/>
+          <a:ext cx="0" cy="0"/>
+          <a:chOff x="0" y="0"/>
+          <a:chExt cx="0" cy="0"/>
+        </a:xfrm>
+      </p:grpSpPr>
+      <p:sp>
+        <p:nvSpPr>
+          <p:cNvPr id="2" name="Title 1"/>
+          <p:cNvSpPr>
+            <a:spLocks noGrp="1"/>
+          </p:cNvSpPr>
+          <p:nvPr>
+            <p:ph type="title"/>
+          </p:nvPr>
+        </p:nvSpPr>
+        <p:spPr/>
+        <p:txBody>
+          <a:bodyPr/>
+          <a:lstStyle/>
+          <a:p>
+            <a:r>
+              <a:rPr lang="en-US" dirty="0" smtClean="0"/>
+              <a:t>Question 3.</a:t>
+            </a:r>
+            <a:endParaRPr lang="en-US" dirty="0"/>
+          </a:p>
+        </p:txBody>
+      </p:sp>
+      <p:sp>
+        <p:nvSpPr>
+          <p:cNvPr id="3" name="Content Placeholder 2"/>
+          <p:cNvSpPr>
+            <a:spLocks noGrp="1"/>
+          </p:cNvSpPr>
+          <p:nvPr>
+            <p:ph idx="1"/>
+          </p:nvPr>
+        </p:nvSpPr>
+        <p:spPr/>
+        <p:txBody>
+          <a:bodyPr>
+            <a:normAutofit/>
+          </a:bodyPr>
+          <a:lstStyle/>
+          <a:p>
+            <a:r>
+              <a:rPr lang="en-US" dirty="0"/>
+              <a:t>Here is the last row of the data.</a:t>
+            </a:r>
+          </a:p>
+          <a:p>
+            <a:r>
+              <a:rPr lang="en-US" sz="1400" dirty="0">
+                <a:latin typeface="Courier New" panose="02070309020205020404" pitchFamily="49" charset="0"/>
+                <a:cs typeface="Courier New" panose="02070309020205020404" pitchFamily="49" charset="0"/>
+              </a:rPr>
+              <a:t>&gt; </a:t>
+            </a:r>
+            <a:r>
+              <a:rPr lang="en-US" sz="1400" dirty="0" err="1">
+                <a:latin typeface="Courier New" panose="02070309020205020404" pitchFamily="49" charset="0"/>
+                <a:cs typeface="Courier New" panose="02070309020205020404" pitchFamily="49" charset="0"/>
+              </a:rPr>
+              <a:t>fd</a:t>
+            </a:r>
+            <a:r>
+              <a:rPr lang="en-US" sz="1400" dirty="0">
+                <a:latin typeface="Courier New" panose="02070309020205020404" pitchFamily="49" charset="0"/>
+                <a:cs typeface="Courier New" panose="02070309020205020404" pitchFamily="49" charset="0"/>
+              </a:rPr>
+              <a:t>[252, ]</a:t>
+            </a:r>
+          </a:p>
+          <a:p>
+            <a:r>
+              <a:rPr lang="en-US" sz="1400" dirty="0">
+                <a:latin typeface="Courier New" panose="02070309020205020404" pitchFamily="49" charset="0"/>
+                <a:cs typeface="Courier New" panose="02070309020205020404" pitchFamily="49" charset="0"/>
+              </a:rPr>
+              <a:t>    case </a:t>
+            </a:r>
+            <a:r>
+              <a:rPr lang="en-US" sz="1400" dirty="0" err="1">
+                <a:latin typeface="Courier New" panose="02070309020205020404" pitchFamily="49" charset="0"/>
+                <a:cs typeface="Courier New" panose="02070309020205020404" pitchFamily="49" charset="0"/>
+              </a:rPr>
+              <a:t>fat.b</a:t>
+            </a:r>
+            <a:r>
+              <a:rPr lang="en-US" sz="1400" dirty="0">
+                <a:latin typeface="Courier New" panose="02070309020205020404" pitchFamily="49" charset="0"/>
+                <a:cs typeface="Courier New" panose="02070309020205020404" pitchFamily="49" charset="0"/>
+              </a:rPr>
+              <a:t> </a:t>
+            </a:r>
+            <a:r>
+              <a:rPr lang="en-US" sz="1400" dirty="0" err="1">
+                <a:latin typeface="Courier New" panose="02070309020205020404" pitchFamily="49" charset="0"/>
+                <a:cs typeface="Courier New" panose="02070309020205020404" pitchFamily="49" charset="0"/>
+              </a:rPr>
+              <a:t>fat.s</a:t>
+            </a:r>
+            <a:r>
+              <a:rPr lang="en-US" sz="1400" dirty="0">
+                <a:latin typeface="Courier New" panose="02070309020205020404" pitchFamily="49" charset="0"/>
+                <a:cs typeface="Courier New" panose="02070309020205020404" pitchFamily="49" charset="0"/>
+              </a:rPr>
+              <a:t>   dens age    </a:t>
+            </a:r>
+            <a:r>
+              <a:rPr lang="en-US" sz="1400" dirty="0" err="1">
+                <a:latin typeface="Courier New" panose="02070309020205020404" pitchFamily="49" charset="0"/>
+                <a:cs typeface="Courier New" panose="02070309020205020404" pitchFamily="49" charset="0"/>
+              </a:rPr>
+              <a:t>wt</a:t>
+            </a:r>
+            <a:r>
+              <a:rPr lang="en-US" sz="1400" dirty="0">
+                <a:latin typeface="Courier New" panose="02070309020205020404" pitchFamily="49" charset="0"/>
+                <a:cs typeface="Courier New" panose="02070309020205020404" pitchFamily="49" charset="0"/>
+              </a:rPr>
+              <a:t> </a:t>
+            </a:r>
+            <a:r>
+              <a:rPr lang="en-US" sz="1400" dirty="0" err="1">
+                <a:latin typeface="Courier New" panose="02070309020205020404" pitchFamily="49" charset="0"/>
+                <a:cs typeface="Courier New" panose="02070309020205020404" pitchFamily="49" charset="0"/>
+              </a:rPr>
+              <a:t>ht</a:t>
+            </a:r>
+            <a:r>
+              <a:rPr lang="en-US" sz="1400" dirty="0">
+                <a:latin typeface="Courier New" panose="02070309020205020404" pitchFamily="49" charset="0"/>
+                <a:cs typeface="Courier New" panose="02070309020205020404" pitchFamily="49" charset="0"/>
+              </a:rPr>
+              <a:t>  </a:t>
+            </a:r>
+            <a:r>
+              <a:rPr lang="en-US" sz="1400" dirty="0" err="1">
+                <a:latin typeface="Courier New" panose="02070309020205020404" pitchFamily="49" charset="0"/>
+                <a:cs typeface="Courier New" panose="02070309020205020404" pitchFamily="49" charset="0"/>
+              </a:rPr>
+              <a:t>bmi</a:t>
+            </a:r>
+            <a:r>
+              <a:rPr lang="en-US" sz="1400" dirty="0">
+                <a:latin typeface="Courier New" panose="02070309020205020404" pitchFamily="49" charset="0"/>
+                <a:cs typeface="Courier New" panose="02070309020205020404" pitchFamily="49" charset="0"/>
+              </a:rPr>
+              <a:t>   </a:t>
+            </a:r>
+            <a:r>
+              <a:rPr lang="en-US" sz="1400" dirty="0" err="1">
+                <a:latin typeface="Courier New" panose="02070309020205020404" pitchFamily="49" charset="0"/>
+                <a:cs typeface="Courier New" panose="02070309020205020404" pitchFamily="49" charset="0"/>
+              </a:rPr>
+              <a:t>ffw</a:t>
+            </a:r>
+            <a:r>
+              <a:rPr lang="en-US" sz="1400" dirty="0">
+                <a:latin typeface="Courier New" panose="02070309020205020404" pitchFamily="49" charset="0"/>
+                <a:cs typeface="Courier New" panose="02070309020205020404" pitchFamily="49" charset="0"/>
+              </a:rPr>
+              <a:t> neck chest abdomen</a:t>
+            </a:r>
+          </a:p>
+          <a:p>
+            <a:r>
+              <a:rPr lang="en-US" sz="1400" dirty="0">
+                <a:latin typeface="Courier New" panose="02070309020205020404" pitchFamily="49" charset="0"/>
+                <a:cs typeface="Courier New" panose="02070309020205020404" pitchFamily="49" charset="0"/>
+              </a:rPr>
+              <a:t>252  252  30.7  31.9 1.0271  74 207.5 70 29.8 143.7 40.8 112.4   108.5</a:t>
+            </a:r>
+          </a:p>
+          <a:p>
+            <a:r>
+              <a:rPr lang="en-US" sz="1400" dirty="0">
+                <a:latin typeface="Courier New" panose="02070309020205020404" pitchFamily="49" charset="0"/>
+                <a:cs typeface="Courier New" panose="02070309020205020404" pitchFamily="49" charset="0"/>
+              </a:rPr>
+              <a:t>      hip thigh knee ankle biceps forearm wrist</a:t>
+            </a:r>
+          </a:p>
+          <a:p>
+            <a:r>
+              <a:rPr lang="en-US" sz="1400" dirty="0">
+                <a:latin typeface="Courier New" panose="02070309020205020404" pitchFamily="49" charset="0"/>
+                <a:cs typeface="Courier New" panose="02070309020205020404" pitchFamily="49" charset="0"/>
+              </a:rPr>
+              <a:t>252 107.1  59.3 42.2  24.6   33.7      30  20.9</a:t>
+            </a:r>
+          </a:p>
+          <a:p>
+            <a:endParaRPr lang="en-US" dirty="0"/>
+          </a:p>
+        </p:txBody>
+      </p:sp>
+    </p:spTree>
+    <p:extLst>
+      <p:ext uri="{BB962C8B-B14F-4D97-AF65-F5344CB8AC3E}">
+        <p14:creationId xmlns:p14="http://schemas.microsoft.com/office/powerpoint/2010/main" val="2424123970"/>
+      </p:ext>
+    </p:extLst>
+  </p:cSld>
+  <p:clrMapOvr>
+    <a:masterClrMapping/>
+  </p:clrMapOvr>
+  <p:timing>
+    <p:tnLst>
+      <p:par>
+        <p:cTn id="1" dur="indefinite" restart="never" nodeType="tmRoot"/>
+      </p:par>
+    </p:tnLst>
+  </p:timing>
+</p:sld>
+</file>
+
 <file path=ppt/slides/slide9.xml><?xml version="1.0" encoding="utf-8"?>
 <p:sld xmlns:a="http://schemas.openxmlformats.org/drawingml/2006/main" xmlns:r="http://schemas.openxmlformats.org/officeDocument/2006/relationships" xmlns:p="http://schemas.openxmlformats.org/presentationml/2006/main">
   <p:cSld>
@@ -4713,7 +5159,7 @@
       </p:grpSpPr>
       <p:sp>
         <p:nvSpPr>
-          <p:cNvPr id="5" name="Title 4"/>
+          <p:cNvPr id="2" name="Title 1"/>
           <p:cNvSpPr>
             <a:spLocks noGrp="1"/>
           </p:cNvSpPr>
@@ -4728,7 +5174,7 @@
           <a:p>
             <a:r>
               <a:rPr lang="en-US" dirty="0" smtClean="0"/>
-              <a:t>Question 6.</a:t>
+              <a:t>Question 4.</a:t>
             </a:r>
             <a:endParaRPr lang="en-US" dirty="0"/>
           </a:p>
@@ -4736,7 +5182,7 @@
       </p:sp>
       <p:sp>
         <p:nvSpPr>
-          <p:cNvPr id="6" name="Content Placeholder 5"/>
+          <p:cNvPr id="3" name="Content Placeholder 2"/>
           <p:cNvSpPr>
             <a:spLocks noGrp="1"/>
           </p:cNvSpPr>
@@ -4746,67 +5192,45 @@
         </p:nvSpPr>
         <p:spPr/>
         <p:txBody>
-          <a:bodyPr/>
-          <a:lstStyle/>
-          <a:p>
-            <a:r>
-              <a:rPr lang="en-US" dirty="0"/>
-              <a:t>Here is a correlation between </a:t>
-            </a:r>
-            <a:r>
-              <a:rPr lang="en-US" dirty="0" err="1"/>
+          <a:bodyPr>
+            <a:normAutofit fontScale="92500" lnSpcReduction="10000"/>
+          </a:bodyPr>
+          <a:lstStyle/>
+          <a:p>
+            <a:r>
+              <a:rPr lang="en-US" sz="3800" dirty="0" smtClean="0"/>
+              <a:t>Here </a:t>
+            </a:r>
+            <a:r>
+              <a:rPr lang="en-US" sz="3800" dirty="0"/>
+              <a:t>is a summary for </a:t>
+            </a:r>
+            <a:r>
+              <a:rPr lang="en-US" sz="3800" dirty="0" err="1"/>
               <a:t>bmi</a:t>
             </a:r>
             <a:r>
-              <a:rPr lang="en-US" dirty="0"/>
-              <a:t> and age.</a:t>
-            </a:r>
-          </a:p>
-          <a:p>
-            <a:r>
-              <a:rPr lang="en-US" dirty="0">
-                <a:latin typeface="Courier New" panose="02070309020205020404" pitchFamily="49" charset="0"/>
-                <a:cs typeface="Courier New" panose="02070309020205020404" pitchFamily="49" charset="0"/>
-              </a:rPr>
-              <a:t>&gt; </a:t>
-            </a:r>
-            <a:r>
-              <a:rPr lang="en-US" dirty="0" err="1">
-                <a:latin typeface="Courier New" panose="02070309020205020404" pitchFamily="49" charset="0"/>
-                <a:cs typeface="Courier New" panose="02070309020205020404" pitchFamily="49" charset="0"/>
-              </a:rPr>
-              <a:t>cor</a:t>
-            </a:r>
-            <a:r>
-              <a:rPr lang="en-US" dirty="0">
-                <a:latin typeface="Courier New" panose="02070309020205020404" pitchFamily="49" charset="0"/>
-                <a:cs typeface="Courier New" panose="02070309020205020404" pitchFamily="49" charset="0"/>
-              </a:rPr>
-              <a:t>(</a:t>
-            </a:r>
-            <a:r>
-              <a:rPr lang="en-US" dirty="0" err="1">
+              <a:rPr lang="en-US" sz="3800" dirty="0"/>
+              <a:t>.</a:t>
+            </a:r>
+          </a:p>
+          <a:p>
+            <a:r>
+              <a:rPr lang="en-US" sz="2200" dirty="0">
+                <a:latin typeface="Courier New" panose="02070309020205020404" pitchFamily="49" charset="0"/>
+                <a:cs typeface="Courier New" panose="02070309020205020404" pitchFamily="49" charset="0"/>
+              </a:rPr>
+              <a:t>&gt; summary(</a:t>
+            </a:r>
+            <a:r>
+              <a:rPr lang="en-US" sz="2200" dirty="0" err="1">
                 <a:latin typeface="Courier New" panose="02070309020205020404" pitchFamily="49" charset="0"/>
                 <a:cs typeface="Courier New" panose="02070309020205020404" pitchFamily="49" charset="0"/>
               </a:rPr>
               <a:t>fd$bmi</a:t>
             </a:r>
             <a:r>
-              <a:rPr lang="en-US" dirty="0">
-                <a:latin typeface="Courier New" panose="02070309020205020404" pitchFamily="49" charset="0"/>
-                <a:cs typeface="Courier New" panose="02070309020205020404" pitchFamily="49" charset="0"/>
-              </a:rPr>
-              <a:t>, </a:t>
-            </a:r>
-            <a:r>
-              <a:rPr lang="en-US" dirty="0" err="1">
-                <a:latin typeface="Courier New" panose="02070309020205020404" pitchFamily="49" charset="0"/>
-                <a:cs typeface="Courier New" panose="02070309020205020404" pitchFamily="49" charset="0"/>
-              </a:rPr>
-              <a:t>fd$age</a:t>
-            </a:r>
-            <a:r>
-              <a:rPr lang="en-US" dirty="0">
+              <a:rPr lang="en-US" sz="2200" dirty="0">
                 <a:latin typeface="Courier New" panose="02070309020205020404" pitchFamily="49" charset="0"/>
                 <a:cs typeface="Courier New" panose="02070309020205020404" pitchFamily="49" charset="0"/>
               </a:rPr>
@@ -4815,30 +5239,29 @@
           </a:p>
           <a:p>
             <a:r>
-              <a:rPr lang="en-US" dirty="0">
-                <a:latin typeface="Courier New" panose="02070309020205020404" pitchFamily="49" charset="0"/>
-                <a:cs typeface="Courier New" panose="02070309020205020404" pitchFamily="49" charset="0"/>
-              </a:rPr>
-              <a:t>[1] 0.1188513</a:t>
-            </a:r>
-          </a:p>
-          <a:p>
-            <a:r>
-              <a:rPr lang="en-US" dirty="0"/>
-              <a:t>The correlation is 0.12. There is little or no association between </a:t>
-            </a:r>
-            <a:r>
-              <a:rPr lang="en-US" dirty="0" err="1"/>
-              <a:t>bmi</a:t>
-            </a:r>
-            <a:r>
-              <a:rPr lang="en-US" dirty="0"/>
-              <a:t> and age</a:t>
-            </a:r>
-            <a:r>
-              <a:rPr lang="en-US" dirty="0" smtClean="0"/>
-              <a:t>.</a:t>
-            </a:r>
+              <a:rPr lang="en-US" sz="2200" dirty="0">
+                <a:latin typeface="Courier New" panose="02070309020205020404" pitchFamily="49" charset="0"/>
+                <a:cs typeface="Courier New" panose="02070309020205020404" pitchFamily="49" charset="0"/>
+              </a:rPr>
+              <a:t>   Min. 1st Qu.  Median    Mean 3rd Qu.    Max. </a:t>
+            </a:r>
+          </a:p>
+          <a:p>
+            <a:r>
+              <a:rPr lang="en-US" sz="2200" dirty="0">
+                <a:latin typeface="Courier New" panose="02070309020205020404" pitchFamily="49" charset="0"/>
+                <a:cs typeface="Courier New" panose="02070309020205020404" pitchFamily="49" charset="0"/>
+              </a:rPr>
+              <a:t>  18.10   23.10   25.05   25.44   27.33   48.90</a:t>
+            </a:r>
+          </a:p>
+          <a:p>
+            <a:r>
+              <a:rPr lang="en-US" sz="3500" dirty="0"/>
+              <a:t>[[NOTE: INTERPRETATION IS IMPORTANT, BOTH HERE AND FOR THE NEXT TWO QUESTIONS. You don’t have to describe every single number, just pick two or three to talk about.]] Rounding to two significant figures, the mean is 25, the range is 18 to 49.</a:t>
+            </a:r>
+          </a:p>
+          <a:p>
             <a:endParaRPr lang="en-US" dirty="0"/>
           </a:p>
         </p:txBody>
@@ -4846,7 +5269,7 @@
     </p:spTree>
     <p:extLst>
       <p:ext uri="{BB962C8B-B14F-4D97-AF65-F5344CB8AC3E}">
-        <p14:creationId xmlns:p14="http://schemas.microsoft.com/office/powerpoint/2010/main" val="4250499533"/>
+        <p14:creationId xmlns:p14="http://schemas.microsoft.com/office/powerpoint/2010/main" val="3625455227"/>
       </p:ext>
     </p:extLst>
   </p:cSld>

</xml_diff>